<commit_message>
fix problem with role name
</commit_message>
<xml_diff>
--- a/Roadmap/slides.pptx
+++ b/Roadmap/slides.pptx
@@ -5,7 +5,7 @@
     <p:sldMasterId id="2147483648" r:id="rId1"/>
   </p:sldMasterIdLst>
   <p:notesMasterIdLst>
-    <p:notesMasterId r:id="rId14"/>
+    <p:notesMasterId r:id="rId16"/>
   </p:notesMasterIdLst>
   <p:sldIdLst>
     <p:sldId id="256" r:id="rId4"/>
@@ -18,6 +18,8 @@
     <p:sldId id="263" r:id="rId11"/>
     <p:sldId id="264" r:id="rId12"/>
     <p:sldId id="265" r:id="rId13"/>
+    <p:sldId id="266" r:id="rId14"/>
+    <p:sldId id="267" r:id="rId15"/>
   </p:sldIdLst>
   <p:sldSz cx="12192000" cy="6858000"/>
   <p:notesSz cx="6858000" cy="9144000"/>
@@ -562,7 +564,7 @@
             <a:pPr>
               <a:defRPr/>
             </a:pPr>
-            <a:fld id="{C8657B28-580B-C647-BF1A-4E38AB85D10F}" type="slidenum">
+            <a:fld id="{8C4D4377-D855-03DF-3805-7B08FAE95E06}" type="slidenum">
               <a:rPr/>
               <a:t/>
             </a:fld>
@@ -644,6 +646,170 @@
             <a:pPr>
               <a:defRPr/>
             </a:pPr>
+            <a:fld id="{11FEBBBD-50D7-54AF-87EB-44A4345588D3}" type="slidenum">
+              <a:rPr/>
+              <a:t/>
+            </a:fld>
+            <a:endParaRPr/>
+          </a:p>
+        </p:txBody>
+      </p:sp>
+    </p:spTree>
+  </p:cSld>
+</p:notes>
+</file>
+
+<file path=ppt/notesSlides/notesSlide11.xml><?xml version="1.0" encoding="utf-8"?>
+<p:notes xmlns:a="http://schemas.openxmlformats.org/drawingml/2006/main" xmlns:r="http://schemas.openxmlformats.org/officeDocument/2006/relationships" xmlns:p="http://schemas.openxmlformats.org/presentationml/2006/main" xmlns:m="http://schemas.openxmlformats.org/officeDocument/2006/math" xmlns:w="http://schemas.openxmlformats.org/wordprocessingml/2006/main">
+  <p:cSld name="">
+    <p:spTree>
+      <p:nvGrpSpPr>
+        <p:cNvPr id="1" name=""/>
+        <p:cNvGrpSpPr/>
+        <p:nvPr/>
+      </p:nvGrpSpPr>
+      <p:grpSpPr bwMode="auto">
+        <a:xfrm>
+          <a:off x="0" y="0"/>
+          <a:ext cx="0" cy="0"/>
+          <a:chOff x="0" y="0"/>
+          <a:chExt cx="0" cy="0"/>
+        </a:xfrm>
+      </p:grpSpPr>
+      <p:sp>
+        <p:nvSpPr>
+          <p:cNvPr id="2" name="Slide Image Placeholder 1"/>
+          <p:cNvSpPr>
+            <a:spLocks noChangeAspect="1" noGrp="1" noRot="1"/>
+          </p:cNvSpPr>
+          <p:nvPr>
+            <p:ph type="sldImg"/>
+          </p:nvPr>
+        </p:nvSpPr>
+        <p:spPr bwMode="auto"/>
+      </p:sp>
+      <p:sp>
+        <p:nvSpPr>
+          <p:cNvPr id="3" name="Notes Placeholder 2"/>
+          <p:cNvSpPr>
+            <a:spLocks noGrp="1"/>
+          </p:cNvSpPr>
+          <p:nvPr>
+            <p:ph type="body" idx="1"/>
+          </p:nvPr>
+        </p:nvSpPr>
+        <p:spPr bwMode="auto"/>
+        <p:txBody>
+          <a:bodyPr/>
+          <a:lstStyle/>
+          <a:p>
+            <a:pPr>
+              <a:defRPr/>
+            </a:pPr>
+            <a:endParaRPr/>
+          </a:p>
+        </p:txBody>
+      </p:sp>
+      <p:sp>
+        <p:nvSpPr>
+          <p:cNvPr id="4" name="Slide Number Placeholder 3"/>
+          <p:cNvSpPr>
+            <a:spLocks noGrp="1"/>
+          </p:cNvSpPr>
+          <p:nvPr>
+            <p:ph type="sldNum" sz="quarter" idx="10"/>
+          </p:nvPr>
+        </p:nvSpPr>
+        <p:spPr bwMode="auto"/>
+        <p:txBody>
+          <a:bodyPr/>
+          <a:lstStyle/>
+          <a:p>
+            <a:pPr>
+              <a:defRPr/>
+            </a:pPr>
+            <a:fld id="{0228112A-7D14-B44A-F7F7-7CF2AFA7B2B4}" type="slidenum">
+              <a:rPr/>
+              <a:t/>
+            </a:fld>
+            <a:endParaRPr/>
+          </a:p>
+        </p:txBody>
+      </p:sp>
+    </p:spTree>
+  </p:cSld>
+</p:notes>
+</file>
+
+<file path=ppt/notesSlides/notesSlide12.xml><?xml version="1.0" encoding="utf-8"?>
+<p:notes xmlns:a="http://schemas.openxmlformats.org/drawingml/2006/main" xmlns:r="http://schemas.openxmlformats.org/officeDocument/2006/relationships" xmlns:p="http://schemas.openxmlformats.org/presentationml/2006/main" xmlns:m="http://schemas.openxmlformats.org/officeDocument/2006/math" xmlns:w="http://schemas.openxmlformats.org/wordprocessingml/2006/main">
+  <p:cSld name="">
+    <p:spTree>
+      <p:nvGrpSpPr>
+        <p:cNvPr id="1" name=""/>
+        <p:cNvGrpSpPr/>
+        <p:nvPr/>
+      </p:nvGrpSpPr>
+      <p:grpSpPr bwMode="auto">
+        <a:xfrm>
+          <a:off x="0" y="0"/>
+          <a:ext cx="0" cy="0"/>
+          <a:chOff x="0" y="0"/>
+          <a:chExt cx="0" cy="0"/>
+        </a:xfrm>
+      </p:grpSpPr>
+      <p:sp>
+        <p:nvSpPr>
+          <p:cNvPr id="2" name="Slide Image Placeholder 1"/>
+          <p:cNvSpPr>
+            <a:spLocks noChangeAspect="1" noGrp="1" noRot="1"/>
+          </p:cNvSpPr>
+          <p:nvPr>
+            <p:ph type="sldImg"/>
+          </p:nvPr>
+        </p:nvSpPr>
+        <p:spPr bwMode="auto"/>
+      </p:sp>
+      <p:sp>
+        <p:nvSpPr>
+          <p:cNvPr id="3" name="Notes Placeholder 2"/>
+          <p:cNvSpPr>
+            <a:spLocks noGrp="1"/>
+          </p:cNvSpPr>
+          <p:nvPr>
+            <p:ph type="body" idx="1"/>
+          </p:nvPr>
+        </p:nvSpPr>
+        <p:spPr bwMode="auto"/>
+        <p:txBody>
+          <a:bodyPr/>
+          <a:lstStyle/>
+          <a:p>
+            <a:pPr>
+              <a:defRPr/>
+            </a:pPr>
+            <a:endParaRPr/>
+          </a:p>
+        </p:txBody>
+      </p:sp>
+      <p:sp>
+        <p:nvSpPr>
+          <p:cNvPr id="4" name="Slide Number Placeholder 3"/>
+          <p:cNvSpPr>
+            <a:spLocks noGrp="1"/>
+          </p:cNvSpPr>
+          <p:nvPr>
+            <p:ph type="sldNum" sz="quarter" idx="10"/>
+          </p:nvPr>
+        </p:nvSpPr>
+        <p:spPr bwMode="auto"/>
+        <p:txBody>
+          <a:bodyPr/>
+          <a:lstStyle/>
+          <a:p>
+            <a:pPr>
+              <a:defRPr/>
+            </a:pPr>
             <a:fld id="{C9E5E905-E047-EFDD-E169-4A5CEAFCB3A1}" type="slidenum">
               <a:rPr/>
               <a:t/>
@@ -726,7 +892,7 @@
             <a:pPr>
               <a:defRPr/>
             </a:pPr>
-            <a:fld id="{03EC3BEF-4CC1-7437-88BA-B3C8CAFF37E0}" type="slidenum">
+            <a:fld id="{C8657B28-580B-C647-BF1A-4E38AB85D10F}" type="slidenum">
               <a:rPr/>
               <a:t/>
             </a:fld>
@@ -808,7 +974,7 @@
             <a:pPr>
               <a:defRPr/>
             </a:pPr>
-            <a:fld id="{FEA1E8E4-9B3A-D57C-5B7B-D48BBF69CA5C}" type="slidenum">
+            <a:fld id="{03EC3BEF-4CC1-7437-88BA-B3C8CAFF37E0}" type="slidenum">
               <a:rPr/>
               <a:t/>
             </a:fld>
@@ -890,7 +1056,7 @@
             <a:pPr>
               <a:defRPr/>
             </a:pPr>
-            <a:fld id="{B2222321-C430-5AA3-DFEE-459779FDE38E}" type="slidenum">
+            <a:fld id="{FEA1E8E4-9B3A-D57C-5B7B-D48BBF69CA5C}" type="slidenum">
               <a:rPr/>
               <a:t/>
             </a:fld>
@@ -972,7 +1138,7 @@
             <a:pPr>
               <a:defRPr/>
             </a:pPr>
-            <a:fld id="{066F8BFB-2088-3E56-7F14-0FB19AD482FA}" type="slidenum">
+            <a:fld id="{B2222321-C430-5AA3-DFEE-459779FDE38E}" type="slidenum">
               <a:rPr/>
               <a:t/>
             </a:fld>
@@ -1004,7 +1170,7 @@
       </p:grpSpPr>
       <p:sp>
         <p:nvSpPr>
-          <p:cNvPr id="523505646" name="Slide Image Placeholder 1"/>
+          <p:cNvPr id="1546856547" name="Slide Image Placeholder 1"/>
           <p:cNvSpPr>
             <a:spLocks noChangeAspect="1" noGrp="1" noRot="1"/>
           </p:cNvSpPr>
@@ -1016,7 +1182,7 @@
       </p:sp>
       <p:sp>
         <p:nvSpPr>
-          <p:cNvPr id="2062093140" name="Notes Placeholder 2"/>
+          <p:cNvPr id="1387636266" name="Notes Placeholder 2"/>
           <p:cNvSpPr>
             <a:spLocks noGrp="1"/>
           </p:cNvSpPr>
@@ -1038,7 +1204,7 @@
       </p:sp>
       <p:sp>
         <p:nvSpPr>
-          <p:cNvPr id="1715382082" name="Slide Number Placeholder 3"/>
+          <p:cNvPr id="1386301750" name="Slide Number Placeholder 3"/>
           <p:cNvSpPr>
             <a:spLocks noGrp="1"/>
           </p:cNvSpPr>
@@ -1054,7 +1220,7 @@
             <a:pPr>
               <a:defRPr/>
             </a:pPr>
-            <a:fld id="{2B38F592-82BF-CF14-471E-9976AEF9F3D9}" type="slidenum">
+            <a:fld id="{B10B6E3B-849E-6531-DF59-C9B04D6B00BB}" type="slidenum">
               <a:rPr/>
               <a:t/>
             </a:fld>
@@ -1136,7 +1302,7 @@
             <a:pPr>
               <a:defRPr/>
             </a:pPr>
-            <a:fld id="{727E2872-39BA-0A90-FC9A-6F78CF44B0B8}" type="slidenum">
+            <a:fld id="{066F8BFB-2088-3E56-7F14-0FB19AD482FA}" type="slidenum">
               <a:rPr/>
               <a:t/>
             </a:fld>
@@ -1168,7 +1334,7 @@
       </p:grpSpPr>
       <p:sp>
         <p:nvSpPr>
-          <p:cNvPr id="2" name="Slide Image Placeholder 1"/>
+          <p:cNvPr id="523505646" name="Slide Image Placeholder 1"/>
           <p:cNvSpPr>
             <a:spLocks noChangeAspect="1" noGrp="1" noRot="1"/>
           </p:cNvSpPr>
@@ -1180,7 +1346,7 @@
       </p:sp>
       <p:sp>
         <p:nvSpPr>
-          <p:cNvPr id="3" name="Notes Placeholder 2"/>
+          <p:cNvPr id="2062093140" name="Notes Placeholder 2"/>
           <p:cNvSpPr>
             <a:spLocks noGrp="1"/>
           </p:cNvSpPr>
@@ -1202,7 +1368,7 @@
       </p:sp>
       <p:sp>
         <p:nvSpPr>
-          <p:cNvPr id="4" name="Slide Number Placeholder 3"/>
+          <p:cNvPr id="1715382082" name="Slide Number Placeholder 3"/>
           <p:cNvSpPr>
             <a:spLocks noGrp="1"/>
           </p:cNvSpPr>
@@ -1218,7 +1384,7 @@
             <a:pPr>
               <a:defRPr/>
             </a:pPr>
-            <a:fld id="{0228112A-7D14-B44A-F7F7-7CF2AFA7B2B4}" type="slidenum">
+            <a:fld id="{2B38F592-82BF-CF14-471E-9976AEF9F3D9}" type="slidenum">
               <a:rPr/>
               <a:t/>
             </a:fld>
@@ -1300,7 +1466,7 @@
             <a:pPr>
               <a:defRPr/>
             </a:pPr>
-            <a:fld id="{11FEBBBD-50D7-54AF-87EB-44A4345588D3}" type="slidenum">
+            <a:fld id="{727E2872-39BA-0A90-FC9A-6F78CF44B0B8}" type="slidenum">
               <a:rPr/>
               <a:t/>
             </a:fld>
@@ -4388,6 +4554,16 @@
 <file path=ppt/slides/slide1.xml><?xml version="1.0" encoding="utf-8"?>
 <p:sld xmlns:a="http://schemas.openxmlformats.org/drawingml/2006/main" xmlns:r="http://schemas.openxmlformats.org/officeDocument/2006/relationships" xmlns:p="http://schemas.openxmlformats.org/presentationml/2006/main" xmlns:m="http://schemas.openxmlformats.org/officeDocument/2006/math" xmlns:w="http://schemas.openxmlformats.org/wordprocessingml/2006/main" xmlns:mc="http://schemas.openxmlformats.org/markup-compatibility/2006" showMasterPhAnim="0" showMasterSp="1" show="1">
   <p:cSld name="">
+    <p:bg>
+      <p:bgPr shadeToTitle="0">
+        <a:blipFill>
+          <a:blip r:embed="rId3">
+            <a:alphaModFix amt="99999"/>
+          </a:blip>
+          <a:stretch/>
+        </a:blipFill>
+      </p:bgPr>
+    </p:bg>
     <p:spTree>
       <p:nvGrpSpPr>
         <p:cNvPr id="1" name=""/>
@@ -4404,175 +4580,45 @@
       </p:grpSpPr>
       <p:sp>
         <p:nvSpPr>
-          <p:cNvPr id="551341814" name="Titel 1"/>
-          <p:cNvSpPr>
-            <a:spLocks noGrp="1"/>
-          </p:cNvSpPr>
-          <p:nvPr>
-            <p:ph type="title"/>
-          </p:nvPr>
-        </p:nvSpPr>
-        <p:spPr bwMode="auto"/>
-        <p:txBody>
-          <a:bodyPr/>
-          <a:lstStyle/>
-          <a:p>
-            <a:pPr>
-              <a:defRPr/>
-            </a:pPr>
-            <a:r>
-              <a:rPr/>
-              <a:t>Aktuelle Situation</a:t>
-            </a:r>
-            <a:endParaRPr/>
-          </a:p>
-        </p:txBody>
-      </p:sp>
-      <p:sp>
-        <p:nvSpPr>
-          <p:cNvPr id="1097597143" name="Inhaltsplatzhalter 2"/>
-          <p:cNvSpPr>
-            <a:spLocks noGrp="1"/>
-          </p:cNvSpPr>
-          <p:nvPr>
-            <p:ph idx="1"/>
-          </p:nvPr>
-        </p:nvSpPr>
-        <p:spPr bwMode="auto"/>
+          <p:cNvPr id="257678611" name=""/>
+          <p:cNvSpPr txBox="1"/>
+          <p:nvPr/>
+        </p:nvSpPr>
+        <p:spPr bwMode="auto">
+          <a:xfrm flipH="0" flipV="0">
+            <a:off x="1521839" y="2468700"/>
+            <a:ext cx="9150119" cy="1920600"/>
+          </a:xfrm>
+          <a:prstGeom prst="rect">
+            <a:avLst/>
+          </a:prstGeom>
+          <a:solidFill>
+            <a:schemeClr val="bg1">
+              <a:alpha val="80000"/>
+            </a:schemeClr>
+          </a:solidFill>
+        </p:spPr>
         <p:txBody>
           <a:bodyPr vertOverflow="overflow" horzOverflow="overflow" vert="horz" wrap="square" lIns="91440" tIns="45720" rIns="91440" bIns="45720" numCol="1" spcCol="0" rtlCol="0" fromWordArt="0" anchor="t" anchorCtr="0" forceAA="0" upright="0" compatLnSpc="0">
-            <a:normAutofit fontScale="75000" lnSpcReduction="5000"/>
+            <a:spAutoFit/>
           </a:bodyPr>
-          <a:lstStyle/>
-          <a:p>
-            <a:pPr>
-              <a:defRPr/>
-            </a:pPr>
-            <a:r>
-              <a:rPr/>
-              <a:t>Windows-PCs</a:t>
-            </a:r>
-            <a:endParaRPr/>
-          </a:p>
-          <a:p>
-            <a:pPr lvl="1">
-              <a:defRPr/>
-            </a:pPr>
-            <a:r>
-              <a:rPr/>
-              <a:t>Alte Poolraum-Rechner</a:t>
-            </a:r>
-            <a:endParaRPr/>
-          </a:p>
-          <a:p>
-            <a:pPr lvl="1">
-              <a:defRPr/>
-            </a:pPr>
-            <a:r>
-              <a:rPr/>
-              <a:t>Kein Internetzugang</a:t>
-            </a:r>
-            <a:r>
-              <a:rPr/>
-              <a:t> (Microsoft-Konto)</a:t>
-            </a:r>
-            <a:endParaRPr/>
-          </a:p>
-          <a:p>
-            <a:pPr lvl="1">
-              <a:defRPr/>
-            </a:pPr>
-            <a:r>
-              <a:rPr/>
-              <a:t>Software / Updates: USB-Stick Installation</a:t>
-            </a:r>
-            <a:endParaRPr/>
-          </a:p>
-          <a:p>
-            <a:pPr lvl="0">
-              <a:defRPr/>
-            </a:pPr>
-            <a:endParaRPr/>
-          </a:p>
-          <a:p>
-            <a:pPr lvl="0">
-              <a:defRPr/>
-            </a:pPr>
-            <a:r>
-              <a:rPr/>
-              <a:t>Vorteile: Bekanntes System für Studierende und Techniker</a:t>
-            </a:r>
-            <a:endParaRPr/>
-          </a:p>
-          <a:p>
-            <a:pPr lvl="0">
-              <a:defRPr/>
-            </a:pPr>
-            <a:r>
-              <a:rPr/>
-              <a:t>Nachteile:</a:t>
-            </a:r>
-            <a:endParaRPr/>
-          </a:p>
-          <a:p>
-            <a:pPr lvl="1">
-              <a:defRPr/>
-            </a:pPr>
-            <a:r>
-              <a:rPr/>
-              <a:t>Dezentral</a:t>
-            </a:r>
-            <a:endParaRPr/>
-          </a:p>
-          <a:p>
-            <a:pPr lvl="1">
-              <a:defRPr/>
-            </a:pPr>
-            <a:r>
-              <a:rPr/>
-              <a:t>Zeitintensiv</a:t>
-            </a:r>
-            <a:endParaRPr/>
-          </a:p>
-          <a:p>
-            <a:pPr lvl="1">
-              <a:defRPr/>
-            </a:pPr>
-            <a:r>
-              <a:rPr/>
-              <a:t>Unflexibel</a:t>
-            </a:r>
-            <a:endParaRPr/>
-          </a:p>
-          <a:p>
-            <a:pPr lvl="1">
-              <a:defRPr/>
-            </a:pPr>
-            <a:r>
-              <a:rPr/>
-              <a:t>Kein Internetzugang</a:t>
-            </a:r>
-            <a:r>
-              <a:rPr/>
-              <a:t> auf den PCs</a:t>
-            </a:r>
-            <a:endParaRPr/>
-          </a:p>
-          <a:p>
-            <a:pPr lvl="1">
-              <a:defRPr/>
-            </a:pPr>
-            <a:r>
-              <a:rPr/>
-              <a:t>Inkompatibel mit Linux-Anwendungen</a:t>
-            </a:r>
-            <a:endParaRPr/>
-          </a:p>
-          <a:p>
-            <a:pPr lvl="1">
-              <a:defRPr/>
-            </a:pPr>
-            <a:endParaRPr/>
+          <a:p>
+            <a:pPr algn="ctr">
+              <a:defRPr/>
+            </a:pPr>
+            <a:r>
+              <a:rPr sz="6000" b="1">
+                <a:solidFill>
+                  <a:srgbClr val="5F7E8D"/>
+                </a:solidFill>
+              </a:rPr>
+              <a:t>Computer-Infrastruktur für das Laborpraktikum</a:t>
+            </a:r>
+            <a:endParaRPr sz="6000" b="1">
+              <a:solidFill>
+                <a:srgbClr val="5F7E8D"/>
+              </a:solidFill>
+            </a:endParaRPr>
           </a:p>
         </p:txBody>
       </p:sp>
@@ -4611,6 +4657,376 @@
       </p:grpSpPr>
       <p:sp>
         <p:nvSpPr>
+          <p:cNvPr id="1149030658" name="Titel 1"/>
+          <p:cNvSpPr>
+            <a:spLocks noGrp="1"/>
+          </p:cNvSpPr>
+          <p:nvPr>
+            <p:ph type="title"/>
+          </p:nvPr>
+        </p:nvSpPr>
+        <p:spPr bwMode="auto"/>
+        <p:txBody>
+          <a:bodyPr/>
+          <a:lstStyle/>
+          <a:p>
+            <a:pPr>
+              <a:defRPr/>
+            </a:pPr>
+            <a:r>
+              <a:rPr/>
+              <a:t>Neues Gerät einrichten:</a:t>
+            </a:r>
+            <a:endParaRPr/>
+          </a:p>
+        </p:txBody>
+      </p:sp>
+      <p:sp>
+        <p:nvSpPr>
+          <p:cNvPr id="1944900826" name="Inhaltsplatzhalter 2"/>
+          <p:cNvSpPr>
+            <a:spLocks noGrp="1"/>
+          </p:cNvSpPr>
+          <p:nvPr>
+            <p:ph idx="1"/>
+          </p:nvPr>
+        </p:nvSpPr>
+        <p:spPr bwMode="auto"/>
+        <p:txBody>
+          <a:bodyPr/>
+          <a:lstStyle/>
+          <a:p>
+            <a:pPr marL="394023" indent="-394023">
+              <a:buFont typeface="Arial"/>
+              <a:buAutoNum type="arabicPeriod"/>
+              <a:defRPr/>
+            </a:pPr>
+            <a:r>
+              <a:rPr/>
+              <a:t>MAC-Adresse des neuen PCs ermitteln</a:t>
+            </a:r>
+            <a:endParaRPr/>
+          </a:p>
+          <a:p>
+            <a:pPr marL="394023" indent="-394023">
+              <a:buFont typeface="Arial"/>
+              <a:buAutoNum type="arabicPeriod"/>
+              <a:defRPr/>
+            </a:pPr>
+            <a:r>
+              <a:rPr/>
+              <a:t>DHCP-Server konfigurieren</a:t>
+            </a:r>
+            <a:endParaRPr/>
+          </a:p>
+          <a:p>
+            <a:pPr lvl="1">
+              <a:defRPr/>
+            </a:pPr>
+            <a:r>
+              <a:rPr/>
+              <a:t>Hostname und IP-Adresse zuweisen</a:t>
+            </a:r>
+            <a:endParaRPr/>
+          </a:p>
+          <a:p>
+            <a:pPr marL="394023" lvl="0" indent="-394023">
+              <a:buFont typeface="Arial"/>
+              <a:buAutoNum type="arabicPeriod"/>
+              <a:defRPr/>
+            </a:pPr>
+            <a:r>
+              <a:rPr/>
+              <a:t>Netzwerk-Boot starten</a:t>
+            </a:r>
+            <a:endParaRPr/>
+          </a:p>
+          <a:p>
+            <a:pPr marL="394023" lvl="0" indent="-394023">
+              <a:buFont typeface="Arial"/>
+              <a:buAutoNum type="arabicPeriod"/>
+              <a:defRPr/>
+            </a:pPr>
+            <a:r>
+              <a:rPr/>
+              <a:t>Ansible</a:t>
+            </a:r>
+            <a:endParaRPr/>
+          </a:p>
+          <a:p>
+            <a:pPr lvl="1">
+              <a:defRPr/>
+            </a:pPr>
+            <a:r>
+              <a:rPr/>
+              <a:t>Neuen Client ins Inventory hinzufügen</a:t>
+            </a:r>
+            <a:endParaRPr/>
+          </a:p>
+          <a:p>
+            <a:pPr lvl="1">
+              <a:defRPr/>
+            </a:pPr>
+            <a:r>
+              <a:rPr/>
+              <a:t>Playbooks ausführen</a:t>
+            </a:r>
+            <a:endParaRPr/>
+          </a:p>
+          <a:p>
+            <a:pPr marL="394023" lvl="0" indent="-394023">
+              <a:buFont typeface="Arial"/>
+              <a:buAutoNum type="arabicPeriod"/>
+              <a:defRPr/>
+            </a:pPr>
+            <a:r>
+              <a:rPr/>
+              <a:t>Ausprobieren (Tutoren)</a:t>
+            </a:r>
+            <a:endParaRPr/>
+          </a:p>
+        </p:txBody>
+      </p:sp>
+    </p:spTree>
+  </p:cSld>
+  <p:clrMapOvr>
+    <a:masterClrMapping/>
+  </p:clrMapOvr>
+  <mc:AlternateContent xmlns:mc="http://schemas.openxmlformats.org/markup-compatibility/2006">
+    <mc:Choice xmlns:p159="http://schemas.microsoft.com/office/powerpoint/2015/09/main" xmlns:p14="http://schemas.microsoft.com/office/powerpoint/2010/main" Requires="p159">
+      <p:transition p14:dur="2000" advClick="1"/>
+    </mc:Choice>
+    <mc:Fallback>
+      <p:transition advClick="1"/>
+    </mc:Fallback>
+  </mc:AlternateContent>
+</p:sld>
+</file>
+
+<file path=ppt/slides/slide11.xml><?xml version="1.0" encoding="utf-8"?>
+<p:sld xmlns:a="http://schemas.openxmlformats.org/drawingml/2006/main" xmlns:r="http://schemas.openxmlformats.org/officeDocument/2006/relationships" xmlns:p="http://schemas.openxmlformats.org/presentationml/2006/main" xmlns:m="http://schemas.openxmlformats.org/officeDocument/2006/math" xmlns:w="http://schemas.openxmlformats.org/wordprocessingml/2006/main" xmlns:mc="http://schemas.openxmlformats.org/markup-compatibility/2006" showMasterPhAnim="0" showMasterSp="1" show="1">
+  <p:cSld name="">
+    <p:spTree>
+      <p:nvGrpSpPr>
+        <p:cNvPr id="1" name=""/>
+        <p:cNvGrpSpPr/>
+        <p:nvPr/>
+      </p:nvGrpSpPr>
+      <p:grpSpPr bwMode="auto">
+        <a:xfrm>
+          <a:off x="0" y="0"/>
+          <a:ext cx="0" cy="0"/>
+          <a:chOff x="0" y="0"/>
+          <a:chExt cx="0" cy="0"/>
+        </a:xfrm>
+      </p:grpSpPr>
+      <p:sp>
+        <p:nvSpPr>
+          <p:cNvPr id="895144052" name="Titel 1"/>
+          <p:cNvSpPr>
+            <a:spLocks noGrp="1"/>
+          </p:cNvSpPr>
+          <p:nvPr>
+            <p:ph type="title"/>
+          </p:nvPr>
+        </p:nvSpPr>
+        <p:spPr bwMode="auto"/>
+        <p:txBody>
+          <a:bodyPr/>
+          <a:lstStyle/>
+          <a:p>
+            <a:pPr>
+              <a:defRPr/>
+            </a:pPr>
+            <a:r>
+              <a:rPr/>
+              <a:t>Arbeitsaufwand</a:t>
+            </a:r>
+            <a:endParaRPr/>
+          </a:p>
+        </p:txBody>
+      </p:sp>
+      <p:sp>
+        <p:nvSpPr>
+          <p:cNvPr id="704333148" name="Inhaltsplatzhalter 2"/>
+          <p:cNvSpPr>
+            <a:spLocks noGrp="1"/>
+          </p:cNvSpPr>
+          <p:nvPr>
+            <p:ph idx="1"/>
+          </p:nvPr>
+        </p:nvSpPr>
+        <p:spPr bwMode="auto"/>
+        <p:txBody>
+          <a:bodyPr vertOverflow="overflow" horzOverflow="overflow" vert="horz" wrap="square" lIns="91440" tIns="45720" rIns="91440" bIns="45720" numCol="1" spcCol="0" rtlCol="0" fromWordArt="0" anchor="t" anchorCtr="0" forceAA="0" upright="0" compatLnSpc="0">
+            <a:normAutofit fontScale="85000" lnSpcReduction="3000"/>
+          </a:bodyPr>
+          <a:lstStyle/>
+          <a:p>
+            <a:pPr>
+              <a:defRPr/>
+            </a:pPr>
+            <a:r>
+              <a:rPr/>
+              <a:t>PXE-Boot Server</a:t>
+            </a:r>
+            <a:endParaRPr/>
+          </a:p>
+          <a:p>
+            <a:pPr lvl="1">
+              <a:defRPr/>
+            </a:pPr>
+            <a:r>
+              <a:rPr/>
+              <a:t>Netzwerk-Konfiguration</a:t>
+            </a:r>
+            <a:endParaRPr/>
+          </a:p>
+          <a:p>
+            <a:pPr lvl="1">
+              <a:defRPr/>
+            </a:pPr>
+            <a:r>
+              <a:rPr/>
+              <a:t>DHCP Server</a:t>
+            </a:r>
+            <a:endParaRPr/>
+          </a:p>
+          <a:p>
+            <a:pPr lvl="0">
+              <a:defRPr/>
+            </a:pPr>
+            <a:endParaRPr/>
+          </a:p>
+          <a:p>
+            <a:pPr>
+              <a:defRPr/>
+            </a:pPr>
+            <a:r>
+              <a:rPr/>
+              <a:t>Orchestrierung: Ansible</a:t>
+            </a:r>
+            <a:endParaRPr/>
+          </a:p>
+          <a:p>
+            <a:pPr marL="685800" marR="0" lvl="1" indent="-228600" algn="l">
+              <a:lnSpc>
+                <a:spcPct val="89000"/>
+              </a:lnSpc>
+              <a:spcBef>
+                <a:spcPts val="499"/>
+              </a:spcBef>
+              <a:spcAft>
+                <a:spcPts val="0"/>
+              </a:spcAft>
+              <a:buFont typeface="Arial"/>
+              <a:buChar char="•"/>
+              <a:defRPr/>
+            </a:pPr>
+            <a:r>
+              <a:rPr lang="de-DE" sz="2300" b="0" i="0" u="none" strike="noStrike" cap="none" spc="0">
+                <a:solidFill>
+                  <a:schemeClr val="tx1"/>
+                </a:solidFill>
+                <a:latin typeface="Arial"/>
+                <a:ea typeface="Arial"/>
+                <a:cs typeface="Arial"/>
+              </a:rPr>
+              <a:t>Versuchs-Software und Playbooks müssen gepflegt werden</a:t>
+            </a:r>
+            <a:endParaRPr/>
+          </a:p>
+          <a:p>
+            <a:pPr lvl="1">
+              <a:defRPr/>
+            </a:pPr>
+            <a:r>
+              <a:rPr/>
+              <a:t>Updates außerhalb der Praktikumszeit</a:t>
+            </a:r>
+            <a:endParaRPr/>
+          </a:p>
+          <a:p>
+            <a:pPr lvl="0">
+              <a:defRPr/>
+            </a:pPr>
+            <a:endParaRPr/>
+          </a:p>
+          <a:p>
+            <a:pPr lvl="0">
+              <a:defRPr/>
+            </a:pPr>
+            <a:r>
+              <a:rPr/>
+              <a:t>NFS-Speicher</a:t>
+            </a:r>
+            <a:r>
+              <a:rPr/>
+              <a:t> &amp; Webserver</a:t>
+            </a:r>
+            <a:endParaRPr/>
+          </a:p>
+          <a:p>
+            <a:pPr lvl="1">
+              <a:defRPr/>
+            </a:pPr>
+            <a:r>
+              <a:rPr/>
+              <a:t>Verfügbarkeit prüfen</a:t>
+            </a:r>
+            <a:r>
+              <a:rPr/>
+              <a:t> (monitoring)</a:t>
+            </a:r>
+            <a:endParaRPr/>
+          </a:p>
+          <a:p>
+            <a:pPr lvl="1">
+              <a:defRPr/>
+            </a:pPr>
+            <a:r>
+              <a:rPr/>
+              <a:t>Nach jedem Semester wieder zurücksetzen</a:t>
+            </a:r>
+            <a:endParaRPr/>
+          </a:p>
+        </p:txBody>
+      </p:sp>
+    </p:spTree>
+  </p:cSld>
+  <p:clrMapOvr>
+    <a:masterClrMapping/>
+  </p:clrMapOvr>
+  <mc:AlternateContent xmlns:mc="http://schemas.openxmlformats.org/markup-compatibility/2006">
+    <mc:Choice xmlns:p159="http://schemas.microsoft.com/office/powerpoint/2015/09/main" xmlns:p14="http://schemas.microsoft.com/office/powerpoint/2010/main" Requires="p159">
+      <p:transition p14:dur="2000" advClick="1"/>
+    </mc:Choice>
+    <mc:Fallback>
+      <p:transition advClick="1"/>
+    </mc:Fallback>
+  </mc:AlternateContent>
+</p:sld>
+</file>
+
+<file path=ppt/slides/slide12.xml><?xml version="1.0" encoding="utf-8"?>
+<p:sld xmlns:a="http://schemas.openxmlformats.org/drawingml/2006/main" xmlns:r="http://schemas.openxmlformats.org/officeDocument/2006/relationships" xmlns:p="http://schemas.openxmlformats.org/presentationml/2006/main" xmlns:m="http://schemas.openxmlformats.org/officeDocument/2006/math" xmlns:w="http://schemas.openxmlformats.org/wordprocessingml/2006/main" xmlns:mc="http://schemas.openxmlformats.org/markup-compatibility/2006" showMasterPhAnim="0" showMasterSp="1" show="1">
+  <p:cSld name="">
+    <p:spTree>
+      <p:nvGrpSpPr>
+        <p:cNvPr id="1" name=""/>
+        <p:cNvGrpSpPr/>
+        <p:nvPr/>
+      </p:nvGrpSpPr>
+      <p:grpSpPr bwMode="auto">
+        <a:xfrm>
+          <a:off x="0" y="0"/>
+          <a:ext cx="0" cy="0"/>
+          <a:chOff x="0" y="0"/>
+          <a:chExt cx="0" cy="0"/>
+        </a:xfrm>
+      </p:grpSpPr>
+      <p:sp>
+        <p:nvSpPr>
           <p:cNvPr id="1142195602" name="Titel 1"/>
           <p:cNvSpPr>
             <a:spLocks noGrp="1"/>
@@ -4754,6 +5170,203 @@
 </file>
 
 <file path=ppt/slides/slide2.xml><?xml version="1.0" encoding="utf-8"?>
+<p:sld xmlns:a="http://schemas.openxmlformats.org/drawingml/2006/main" xmlns:r="http://schemas.openxmlformats.org/officeDocument/2006/relationships" xmlns:p="http://schemas.openxmlformats.org/presentationml/2006/main" xmlns:m="http://schemas.openxmlformats.org/officeDocument/2006/math" xmlns:w="http://schemas.openxmlformats.org/wordprocessingml/2006/main" xmlns:mc="http://schemas.openxmlformats.org/markup-compatibility/2006" showMasterPhAnim="0" showMasterSp="1" show="1">
+  <p:cSld name="">
+    <p:spTree>
+      <p:nvGrpSpPr>
+        <p:cNvPr id="1" name=""/>
+        <p:cNvGrpSpPr/>
+        <p:nvPr/>
+      </p:nvGrpSpPr>
+      <p:grpSpPr bwMode="auto">
+        <a:xfrm>
+          <a:off x="0" y="0"/>
+          <a:ext cx="0" cy="0"/>
+          <a:chOff x="0" y="0"/>
+          <a:chExt cx="0" cy="0"/>
+        </a:xfrm>
+      </p:grpSpPr>
+      <p:sp>
+        <p:nvSpPr>
+          <p:cNvPr id="551341814" name="Titel 1"/>
+          <p:cNvSpPr>
+            <a:spLocks noGrp="1"/>
+          </p:cNvSpPr>
+          <p:nvPr>
+            <p:ph type="title"/>
+          </p:nvPr>
+        </p:nvSpPr>
+        <p:spPr bwMode="auto"/>
+        <p:txBody>
+          <a:bodyPr/>
+          <a:lstStyle/>
+          <a:p>
+            <a:pPr>
+              <a:defRPr/>
+            </a:pPr>
+            <a:r>
+              <a:rPr/>
+              <a:t>Aktuelle Situation</a:t>
+            </a:r>
+            <a:endParaRPr/>
+          </a:p>
+        </p:txBody>
+      </p:sp>
+      <p:sp>
+        <p:nvSpPr>
+          <p:cNvPr id="1097597143" name="Inhaltsplatzhalter 2"/>
+          <p:cNvSpPr>
+            <a:spLocks noGrp="1"/>
+          </p:cNvSpPr>
+          <p:nvPr>
+            <p:ph idx="1"/>
+          </p:nvPr>
+        </p:nvSpPr>
+        <p:spPr bwMode="auto"/>
+        <p:txBody>
+          <a:bodyPr vertOverflow="overflow" horzOverflow="overflow" vert="horz" wrap="square" lIns="91440" tIns="45720" rIns="91440" bIns="45720" numCol="1" spcCol="0" rtlCol="0" fromWordArt="0" anchor="t" anchorCtr="0" forceAA="0" upright="0" compatLnSpc="0">
+            <a:normAutofit fontScale="85000" lnSpcReduction="3000"/>
+          </a:bodyPr>
+          <a:lstStyle/>
+          <a:p>
+            <a:pPr>
+              <a:defRPr/>
+            </a:pPr>
+            <a:r>
+              <a:rPr/>
+              <a:t>Windows-PCs</a:t>
+            </a:r>
+            <a:endParaRPr/>
+          </a:p>
+          <a:p>
+            <a:pPr lvl="1">
+              <a:defRPr/>
+            </a:pPr>
+            <a:r>
+              <a:rPr/>
+              <a:t>Keine Internetanbindung</a:t>
+            </a:r>
+            <a:endParaRPr/>
+          </a:p>
+          <a:p>
+            <a:pPr lvl="1">
+              <a:defRPr/>
+            </a:pPr>
+            <a:r>
+              <a:rPr/>
+              <a:t>Software / Updates: </a:t>
+            </a:r>
+            <a:r>
+              <a:rPr/>
+              <a:t>Installation mit USB-Stick</a:t>
+            </a:r>
+            <a:endParaRPr/>
+          </a:p>
+          <a:p>
+            <a:pPr lvl="0">
+              <a:defRPr/>
+            </a:pPr>
+            <a:endParaRPr/>
+          </a:p>
+          <a:p>
+            <a:pPr lvl="0">
+              <a:defRPr/>
+            </a:pPr>
+            <a:r>
+              <a:rPr/>
+              <a:t>Vorteile: Bekanntes System für Techniker</a:t>
+            </a:r>
+            <a:endParaRPr/>
+          </a:p>
+          <a:p>
+            <a:pPr lvl="0">
+              <a:defRPr/>
+            </a:pPr>
+            <a:r>
+              <a:rPr/>
+              <a:t>Nachteile:</a:t>
+            </a:r>
+            <a:endParaRPr/>
+          </a:p>
+          <a:p>
+            <a:pPr lvl="1">
+              <a:defRPr/>
+            </a:pPr>
+            <a:r>
+              <a:rPr/>
+              <a:t>Dezentral</a:t>
+            </a:r>
+            <a:endParaRPr/>
+          </a:p>
+          <a:p>
+            <a:pPr lvl="1">
+              <a:defRPr/>
+            </a:pPr>
+            <a:r>
+              <a:rPr/>
+              <a:t>Zeitintensiv</a:t>
+            </a:r>
+            <a:endParaRPr/>
+          </a:p>
+          <a:p>
+            <a:pPr lvl="1">
+              <a:defRPr/>
+            </a:pPr>
+            <a:r>
+              <a:rPr/>
+              <a:t>Unflexibel</a:t>
+            </a:r>
+            <a:endParaRPr/>
+          </a:p>
+          <a:p>
+            <a:pPr lvl="1">
+              <a:defRPr/>
+            </a:pPr>
+            <a:r>
+              <a:rPr/>
+              <a:t>Kein Internetzugang</a:t>
+            </a:r>
+            <a:r>
+              <a:rPr/>
+              <a:t> auf den PCs</a:t>
+            </a:r>
+            <a:endParaRPr/>
+          </a:p>
+          <a:p>
+            <a:pPr lvl="1">
+              <a:defRPr/>
+            </a:pPr>
+            <a:r>
+              <a:rPr/>
+              <a:t>Inkompatibel mit Linux-Anwendungen</a:t>
+            </a:r>
+            <a:endParaRPr/>
+          </a:p>
+          <a:p>
+            <a:pPr lvl="1">
+              <a:defRPr/>
+            </a:pPr>
+            <a:endParaRPr/>
+          </a:p>
+        </p:txBody>
+      </p:sp>
+    </p:spTree>
+  </p:cSld>
+  <p:clrMapOvr>
+    <a:masterClrMapping/>
+  </p:clrMapOvr>
+  <mc:AlternateContent xmlns:mc="http://schemas.openxmlformats.org/markup-compatibility/2006">
+    <mc:Choice xmlns:p159="http://schemas.microsoft.com/office/powerpoint/2015/09/main" xmlns:p14="http://schemas.microsoft.com/office/powerpoint/2010/main" Requires="p159">
+      <p:transition p14:dur="2000" advClick="1"/>
+    </mc:Choice>
+    <mc:Fallback>
+      <p:transition advClick="1"/>
+    </mc:Fallback>
+  </mc:AlternateContent>
+</p:sld>
+</file>
+
+<file path=ppt/slides/slide3.xml><?xml version="1.0" encoding="utf-8"?>
 <p:sld xmlns:a="http://schemas.openxmlformats.org/drawingml/2006/main" xmlns:r="http://schemas.openxmlformats.org/officeDocument/2006/relationships" xmlns:p="http://schemas.openxmlformats.org/presentationml/2006/main" xmlns:m="http://schemas.openxmlformats.org/officeDocument/2006/math" xmlns:w="http://schemas.openxmlformats.org/wordprocessingml/2006/main" xmlns:mc="http://schemas.openxmlformats.org/markup-compatibility/2006" showMasterPhAnim="0" showMasterSp="1" show="1">
   <p:cSld name="">
     <p:spTree>
@@ -5631,215 +6244,6 @@
 </p:sld>
 </file>
 
-<file path=ppt/slides/slide3.xml><?xml version="1.0" encoding="utf-8"?>
-<p:sld xmlns:a="http://schemas.openxmlformats.org/drawingml/2006/main" xmlns:r="http://schemas.openxmlformats.org/officeDocument/2006/relationships" xmlns:p="http://schemas.openxmlformats.org/presentationml/2006/main" xmlns:m="http://schemas.openxmlformats.org/officeDocument/2006/math" xmlns:w="http://schemas.openxmlformats.org/wordprocessingml/2006/main" xmlns:mc="http://schemas.openxmlformats.org/markup-compatibility/2006" showMasterPhAnim="0" showMasterSp="1" show="1">
-  <p:cSld name="">
-    <p:spTree>
-      <p:nvGrpSpPr>
-        <p:cNvPr id="1" name=""/>
-        <p:cNvGrpSpPr/>
-        <p:nvPr/>
-      </p:nvGrpSpPr>
-      <p:grpSpPr bwMode="auto">
-        <a:xfrm>
-          <a:off x="0" y="0"/>
-          <a:ext cx="0" cy="0"/>
-          <a:chOff x="0" y="0"/>
-          <a:chExt cx="0" cy="0"/>
-        </a:xfrm>
-      </p:grpSpPr>
-      <p:sp>
-        <p:nvSpPr>
-          <p:cNvPr id="1323352501" name="Titel 1"/>
-          <p:cNvSpPr>
-            <a:spLocks noGrp="1"/>
-          </p:cNvSpPr>
-          <p:nvPr>
-            <p:ph type="title"/>
-          </p:nvPr>
-        </p:nvSpPr>
-        <p:spPr bwMode="auto"/>
-        <p:txBody>
-          <a:bodyPr/>
-          <a:lstStyle/>
-          <a:p>
-            <a:pPr>
-              <a:defRPr/>
-            </a:pPr>
-            <a:r>
-              <a:rPr lang="de-DE" sz="4400" b="0" i="0" u="none" strike="noStrike" cap="none" spc="0">
-                <a:solidFill>
-                  <a:schemeClr val="tx1"/>
-                </a:solidFill>
-                <a:latin typeface="Arial"/>
-                <a:ea typeface="Arial"/>
-                <a:cs typeface="Arial"/>
-              </a:rPr>
-              <a:t>Vorschlag: Zentrales Management</a:t>
-            </a:r>
-            <a:endParaRPr sz="4400"/>
-          </a:p>
-        </p:txBody>
-      </p:sp>
-      <p:sp>
-        <p:nvSpPr>
-          <p:cNvPr id="1637671961" name="Inhaltsplatzhalter 2"/>
-          <p:cNvSpPr>
-            <a:spLocks noGrp="1"/>
-          </p:cNvSpPr>
-          <p:nvPr>
-            <p:ph idx="1"/>
-          </p:nvPr>
-        </p:nvSpPr>
-        <p:spPr bwMode="auto"/>
-        <p:txBody>
-          <a:bodyPr vertOverflow="overflow" horzOverflow="overflow" vert="horz" wrap="square" lIns="91440" tIns="45720" rIns="91440" bIns="45720" numCol="1" spcCol="0" rtlCol="0" fromWordArt="0" anchor="t" anchorCtr="0" forceAA="0" upright="0" compatLnSpc="0">
-            <a:normAutofit fontScale="95000" lnSpcReduction="1000"/>
-          </a:bodyPr>
-          <a:lstStyle/>
-          <a:p>
-            <a:pPr lvl="0">
-              <a:defRPr/>
-            </a:pPr>
-            <a:r>
-              <a:rPr/>
-              <a:t>Vorteile:</a:t>
-            </a:r>
-            <a:endParaRPr/>
-          </a:p>
-          <a:p>
-            <a:pPr lvl="1">
-              <a:defRPr/>
-            </a:pPr>
-            <a:r>
-              <a:rPr/>
-              <a:t>Kompatibel mit </a:t>
-            </a:r>
-            <a:r>
-              <a:rPr/>
-              <a:t>Linux und Windows</a:t>
-            </a:r>
-            <a:endParaRPr/>
-          </a:p>
-          <a:p>
-            <a:pPr lvl="1">
-              <a:defRPr/>
-            </a:pPr>
-            <a:r>
-              <a:rPr/>
-              <a:t>Weniger Arbeitsaufwand</a:t>
-            </a:r>
-            <a:endParaRPr/>
-          </a:p>
-          <a:p>
-            <a:pPr lvl="1">
-              <a:defRPr/>
-            </a:pPr>
-            <a:r>
-              <a:rPr/>
-              <a:t>Weniger Einschränkungen (z.B. Internetzugang)</a:t>
-            </a:r>
-            <a:endParaRPr/>
-          </a:p>
-          <a:p>
-            <a:pPr lvl="1">
-              <a:defRPr/>
-            </a:pPr>
-            <a:r>
-              <a:rPr/>
-              <a:t>Wartbarkeit</a:t>
-            </a:r>
-            <a:r>
-              <a:rPr/>
-              <a:t> (auch in Zukunft gewährleistet)</a:t>
-            </a:r>
-            <a:endParaRPr/>
-          </a:p>
-          <a:p>
-            <a:pPr lvl="1">
-              <a:defRPr/>
-            </a:pPr>
-            <a:r>
-              <a:rPr/>
-              <a:t>Schnelle Handlungsfähigkeit bei Ausfällen</a:t>
-            </a:r>
-            <a:endParaRPr/>
-          </a:p>
-          <a:p>
-            <a:pPr lvl="1">
-              <a:defRPr/>
-            </a:pPr>
-            <a:r>
-              <a:rPr/>
-              <a:t>Flexible Bereitstellung von Sicherheitsmaßnahmen</a:t>
-            </a:r>
-            <a:endParaRPr/>
-          </a:p>
-          <a:p>
-            <a:pPr lvl="1">
-              <a:defRPr/>
-            </a:pPr>
-            <a:r>
-              <a:rPr/>
-              <a:t>Einfach erweiterbar</a:t>
-            </a:r>
-            <a:endParaRPr/>
-          </a:p>
-          <a:p>
-            <a:pPr lvl="1">
-              <a:defRPr/>
-            </a:pPr>
-            <a:endParaRPr/>
-          </a:p>
-          <a:p>
-            <a:pPr lvl="0">
-              <a:defRPr/>
-            </a:pPr>
-            <a:r>
-              <a:rPr/>
-              <a:t>Nachteile:</a:t>
-            </a:r>
-            <a:endParaRPr/>
-          </a:p>
-          <a:p>
-            <a:pPr lvl="1">
-              <a:defRPr/>
-            </a:pPr>
-            <a:r>
-              <a:rPr lang="de-DE" sz="2400" b="0" i="0" u="none" strike="noStrike" cap="none" spc="0">
-                <a:solidFill>
-                  <a:schemeClr val="tx1"/>
-                </a:solidFill>
-                <a:latin typeface="+mn-lt"/>
-                <a:ea typeface="+mn-ea"/>
-                <a:cs typeface="+mn-cs"/>
-              </a:rPr>
-              <a:t>Anfangsinvestition</a:t>
-            </a:r>
-            <a:r>
-              <a:rPr/>
-              <a:t>: Wir müssen uns für diese Veränderung vorbereiten</a:t>
-            </a:r>
-            <a:endParaRPr/>
-          </a:p>
-        </p:txBody>
-      </p:sp>
-    </p:spTree>
-  </p:cSld>
-  <p:clrMapOvr>
-    <a:masterClrMapping/>
-  </p:clrMapOvr>
-  <mc:AlternateContent xmlns:mc="http://schemas.openxmlformats.org/markup-compatibility/2006">
-    <mc:Choice xmlns:p159="http://schemas.microsoft.com/office/powerpoint/2015/09/main" xmlns:p14="http://schemas.microsoft.com/office/powerpoint/2010/main" Requires="p159">
-      <p:transition p14:dur="2000" advClick="1"/>
-    </mc:Choice>
-    <mc:Fallback>
-      <p:transition advClick="1"/>
-    </mc:Fallback>
-  </mc:AlternateContent>
-</p:sld>
-</file>
-
 <file path=ppt/slides/slide4.xml><?xml version="1.0" encoding="utf-8"?>
 <p:sld xmlns:a="http://schemas.openxmlformats.org/drawingml/2006/main" xmlns:r="http://schemas.openxmlformats.org/officeDocument/2006/relationships" xmlns:p="http://schemas.openxmlformats.org/presentationml/2006/main" xmlns:m="http://schemas.openxmlformats.org/officeDocument/2006/math" xmlns:w="http://schemas.openxmlformats.org/wordprocessingml/2006/main" xmlns:mc="http://schemas.openxmlformats.org/markup-compatibility/2006" showMasterPhAnim="0" showMasterSp="1" show="1">
   <p:cSld name="">
@@ -5859,7 +6263,7 @@
       </p:grpSpPr>
       <p:sp>
         <p:nvSpPr>
-          <p:cNvPr id="292512146" name="Titel 1"/>
+          <p:cNvPr id="1323352501" name="Titel 1"/>
           <p:cNvSpPr>
             <a:spLocks noGrp="1"/>
           </p:cNvSpPr>
@@ -5876,101 +6280,200 @@
               <a:defRPr/>
             </a:pPr>
             <a:r>
-              <a:rPr/>
-              <a:t>Linux-Installation: PXE</a:t>
-            </a:r>
-            <a:endParaRPr/>
-          </a:p>
-        </p:txBody>
-      </p:sp>
-      <p:sp>
-        <p:nvSpPr>
-          <p:cNvPr id="1178442517" name="Inhaltsplatzhalter 3"/>
-          <p:cNvSpPr>
-            <a:spLocks noGrp="1"/>
-          </p:cNvSpPr>
-          <p:nvPr>
-            <p:ph sz="half" idx="2"/>
-          </p:nvPr>
-        </p:nvSpPr>
-        <p:spPr bwMode="auto">
-          <a:xfrm flipH="0" flipV="0">
-            <a:off x="6487499" y="1825624"/>
-            <a:ext cx="4866298" cy="4351338"/>
-          </a:xfrm>
-        </p:spPr>
+              <a:rPr lang="de-DE" sz="4400" b="0" i="0" u="none" strike="noStrike" cap="none" spc="0">
+                <a:solidFill>
+                  <a:schemeClr val="tx1"/>
+                </a:solidFill>
+                <a:latin typeface="Arial"/>
+                <a:ea typeface="Arial"/>
+                <a:cs typeface="Arial"/>
+              </a:rPr>
+              <a:t>Vorschlag: Zentrales Management</a:t>
+            </a:r>
+            <a:endParaRPr sz="4400"/>
+          </a:p>
+        </p:txBody>
+      </p:sp>
+      <p:sp>
+        <p:nvSpPr>
+          <p:cNvPr id="1637671961" name="Inhaltsplatzhalter 2"/>
+          <p:cNvSpPr>
+            <a:spLocks noGrp="1"/>
+          </p:cNvSpPr>
+          <p:nvPr>
+            <p:ph idx="1"/>
+          </p:nvPr>
+        </p:nvSpPr>
+        <p:spPr bwMode="auto"/>
         <p:txBody>
           <a:bodyPr vertOverflow="overflow" horzOverflow="overflow" vert="horz" wrap="square" lIns="91440" tIns="45720" rIns="91440" bIns="45720" numCol="1" spcCol="0" rtlCol="0" fromWordArt="0" anchor="t" anchorCtr="0" forceAA="0" upright="0" compatLnSpc="0">
-            <a:normAutofit/>
+            <a:normAutofit fontScale="95000" lnSpcReduction="1000"/>
           </a:bodyPr>
           <a:lstStyle/>
           <a:p>
-            <a:pPr>
-              <a:lnSpc>
-                <a:spcPct val="114999"/>
-              </a:lnSpc>
+            <a:pPr lvl="0">
               <a:defRPr/>
             </a:pPr>
             <a:r>
               <a:rPr/>
-              <a:t>Betriebssystem-Installation</a:t>
-            </a:r>
-            <a:endParaRPr/>
-          </a:p>
-          <a:p>
-            <a:pPr>
-              <a:lnSpc>
-                <a:spcPct val="114999"/>
-              </a:lnSpc>
+              <a:t>Vorteile:</a:t>
+            </a:r>
+            <a:endParaRPr/>
+          </a:p>
+          <a:p>
+            <a:pPr lvl="1">
               <a:defRPr/>
             </a:pPr>
             <a:r>
               <a:rPr/>
-              <a:t>Vorkonfigurierter Installationsprozess</a:t>
+              <a:t>Kompatibel mit </a:t>
+            </a:r>
+            <a:r>
+              <a:rPr/>
+              <a:t>Linux und Windows</a:t>
             </a:r>
             <a:endParaRPr/>
           </a:p>
           <a:p>
             <a:pPr lvl="1">
-              <a:lnSpc>
-                <a:spcPct val="114999"/>
-              </a:lnSpc>
               <a:defRPr/>
             </a:pPr>
             <a:r>
               <a:rPr/>
-              <a:t>Remote-Zugriff</a:t>
+              <a:t>Weniger Arbeitsaufwand</a:t>
             </a:r>
             <a:endParaRPr/>
           </a:p>
           <a:p>
             <a:pPr lvl="1">
-              <a:lnSpc>
-                <a:spcPct val="114999"/>
-              </a:lnSpc>
               <a:defRPr/>
             </a:pPr>
             <a:r>
               <a:rPr/>
-              <a:t>IP-Konfiguration</a:t>
+              <a:t>Internet-Zugang im Praktikum (Jupyter-Notebook)</a:t>
             </a:r>
             <a:endParaRPr/>
           </a:p>
           <a:p>
             <a:pPr lvl="1">
-              <a:lnSpc>
-                <a:spcPct val="114999"/>
-              </a:lnSpc>
               <a:defRPr/>
             </a:pPr>
             <a:r>
               <a:rPr/>
-              <a:t>Bereit für Ansible</a:t>
-            </a:r>
-            <a:endParaRPr/>
-          </a:p>
-        </p:txBody>
-      </p:sp>
+              <a:t>Wartbarkeit</a:t>
+            </a:r>
+            <a:r>
+              <a:rPr/>
+              <a:t> auch in Zukunft gewährleistet</a:t>
+            </a:r>
+            <a:endParaRPr/>
+          </a:p>
+          <a:p>
+            <a:pPr lvl="1">
+              <a:defRPr/>
+            </a:pPr>
+            <a:r>
+              <a:rPr/>
+              <a:t>Schnelle Handlungsfähigkeit bei Ausfällen</a:t>
+            </a:r>
+            <a:endParaRPr/>
+          </a:p>
+          <a:p>
+            <a:pPr lvl="1">
+              <a:defRPr/>
+            </a:pPr>
+            <a:r>
+              <a:rPr/>
+              <a:t>Flexible Bereitstellung von </a:t>
+            </a:r>
+            <a:r>
+              <a:rPr/>
+              <a:t>Updates (Sicherheitsmaßnahmen)</a:t>
+            </a:r>
+            <a:endParaRPr/>
+          </a:p>
+          <a:p>
+            <a:pPr lvl="1">
+              <a:defRPr/>
+            </a:pPr>
+            <a:r>
+              <a:rPr/>
+              <a:t>Einfach erweiterbar</a:t>
+            </a:r>
+            <a:endParaRPr/>
+          </a:p>
+          <a:p>
+            <a:pPr lvl="1">
+              <a:defRPr/>
+            </a:pPr>
+            <a:endParaRPr/>
+          </a:p>
+          <a:p>
+            <a:pPr lvl="0">
+              <a:defRPr/>
+            </a:pPr>
+            <a:r>
+              <a:rPr/>
+              <a:t>Nachteile:</a:t>
+            </a:r>
+            <a:endParaRPr/>
+          </a:p>
+          <a:p>
+            <a:pPr lvl="1">
+              <a:defRPr/>
+            </a:pPr>
+            <a:r>
+              <a:rPr lang="de-DE" sz="2400" b="0" i="0" u="none" strike="noStrike" cap="none" spc="0">
+                <a:solidFill>
+                  <a:schemeClr val="tx1"/>
+                </a:solidFill>
+                <a:latin typeface="+mn-lt"/>
+                <a:ea typeface="+mn-ea"/>
+                <a:cs typeface="+mn-cs"/>
+              </a:rPr>
+              <a:t>Anfangsinvestition</a:t>
+            </a:r>
+            <a:r>
+              <a:rPr/>
+              <a:t>: Wir müssen für diese Veränderung bereit sein</a:t>
+            </a:r>
+            <a:endParaRPr/>
+          </a:p>
+        </p:txBody>
+      </p:sp>
+    </p:spTree>
+  </p:cSld>
+  <p:clrMapOvr>
+    <a:masterClrMapping/>
+  </p:clrMapOvr>
+  <mc:AlternateContent xmlns:mc="http://schemas.openxmlformats.org/markup-compatibility/2006">
+    <mc:Choice xmlns:p159="http://schemas.microsoft.com/office/powerpoint/2015/09/main" xmlns:p14="http://schemas.microsoft.com/office/powerpoint/2010/main" Requires="p159">
+      <p:transition p14:dur="2000" advClick="1"/>
+    </mc:Choice>
+    <mc:Fallback>
+      <p:transition advClick="1"/>
+    </mc:Fallback>
+  </mc:AlternateContent>
+</p:sld>
+</file>
+
+<file path=ppt/slides/slide5.xml><?xml version="1.0" encoding="utf-8"?>
+<p:sld xmlns:a="http://schemas.openxmlformats.org/drawingml/2006/main" xmlns:r="http://schemas.openxmlformats.org/officeDocument/2006/relationships" xmlns:p="http://schemas.openxmlformats.org/presentationml/2006/main" xmlns:m="http://schemas.openxmlformats.org/officeDocument/2006/math" xmlns:w="http://schemas.openxmlformats.org/wordprocessingml/2006/main" xmlns:mc="http://schemas.openxmlformats.org/markup-compatibility/2006" showMasterPhAnim="0" showMasterSp="1" show="1">
+  <p:cSld name="">
+    <p:spTree>
+      <p:nvGrpSpPr>
+        <p:cNvPr id="1" name=""/>
+        <p:cNvGrpSpPr/>
+        <p:nvPr/>
+      </p:nvGrpSpPr>
+      <p:grpSpPr bwMode="auto">
+        <a:xfrm>
+          <a:off x="0" y="0"/>
+          <a:ext cx="0" cy="0"/>
+          <a:chOff x="0" y="0"/>
+          <a:chExt cx="0" cy="0"/>
+        </a:xfrm>
+      </p:grpSpPr>
       <p:sp>
         <p:nvSpPr>
           <p:cNvPr id="1187268752" name=""/>
@@ -5979,7 +6482,7 @@
         </p:nvSpPr>
         <p:spPr bwMode="auto">
           <a:xfrm rot="0" flipH="0" flipV="0">
-            <a:off x="838198" y="2327549"/>
+            <a:off x="838198" y="2327548"/>
             <a:ext cx="3352799" cy="3019424"/>
           </a:xfrm>
           <a:prstGeom prst="rect">
@@ -6011,303 +6514,155 @@
           </a:fontRef>
         </p:style>
       </p:sp>
-      <p:grpSp>
-        <p:nvGrpSpPr>
-          <p:cNvPr id="2061121082" name=""/>
-          <p:cNvGrpSpPr/>
+      <p:sp>
+        <p:nvSpPr>
+          <p:cNvPr id="1525436052" name=""/>
+          <p:cNvSpPr/>
           <p:nvPr/>
-        </p:nvGrpSpPr>
-        <p:grpSpPr bwMode="auto">
-          <a:xfrm rot="0" flipH="0" flipV="0">
-            <a:off x="1487904" y="3794399"/>
-            <a:ext cx="1369471" cy="366120"/>
-            <a:chOff x="0" y="0"/>
-            <a:chExt cx="1369471" cy="366120"/>
+        </p:nvSpPr>
+        <p:spPr bwMode="auto">
+          <a:xfrm flipH="0" flipV="0">
+            <a:off x="1488838" y="2696760"/>
+            <a:ext cx="2349372" cy="1829877"/>
           </a:xfrm>
-        </p:grpSpPr>
-        <p:sp>
-          <p:nvSpPr>
-            <p:cNvPr id="2086504650" name=""/>
-            <p:cNvSpPr/>
-            <p:nvPr/>
-          </p:nvSpPr>
-          <p:spPr bwMode="auto">
-            <a:xfrm flipH="0" flipV="0">
-              <a:off x="0" y="0"/>
-              <a:ext cx="1368751" cy="366120"/>
-            </a:xfrm>
-            <a:prstGeom prst="rect">
-              <a:avLst/>
-            </a:prstGeom>
+          <a:prstGeom prst="rect">
+            <a:avLst/>
+          </a:prstGeom>
+          <a:solidFill>
+            <a:srgbClr val="1F4E79"/>
+          </a:solidFill>
+          <a:ln w="12700" cap="flat" cmpd="sng" algn="ctr">
             <a:noFill/>
-            <a:ln w="19049" cap="flat" cmpd="sng" algn="ctr">
-              <a:solidFill>
-                <a:srgbClr val="00BCD9"/>
-              </a:solidFill>
-              <a:prstDash val="solid"/>
-              <a:miter lim="800000"/>
-            </a:ln>
-          </p:spPr>
-          <p:style>
-            <a:lnRef idx="2">
-              <a:schemeClr val="accent1">
-                <a:shade val="50000"/>
-              </a:schemeClr>
-            </a:lnRef>
-            <a:fillRef idx="1">
-              <a:schemeClr val="accent1"/>
-            </a:fillRef>
-            <a:effectRef idx="0">
-              <a:schemeClr val="accent1"/>
-            </a:effectRef>
-            <a:fontRef idx="minor">
-              <a:schemeClr val="lt1"/>
-            </a:fontRef>
-          </p:style>
-        </p:sp>
-        <p:sp>
-          <p:nvSpPr>
-            <p:cNvPr id="789775263" name=""/>
-            <p:cNvSpPr txBox="1"/>
-            <p:nvPr/>
-          </p:nvSpPr>
-          <p:spPr bwMode="auto">
-            <a:xfrm flipH="0" flipV="0">
-              <a:off x="0" y="0"/>
-              <a:ext cx="1369471" cy="366119"/>
-            </a:xfrm>
-            <a:prstGeom prst="rect">
-              <a:avLst/>
-            </a:prstGeom>
-            <a:solidFill>
-              <a:schemeClr val="accent1">
-                <a:lumMod val="50000"/>
-              </a:schemeClr>
-            </a:solidFill>
-          </p:spPr>
-          <p:txBody>
-            <a:bodyPr vertOverflow="overflow" horzOverflow="overflow" vert="horz" wrap="square" lIns="91440" tIns="45720" rIns="91440" bIns="45720" numCol="1" spcCol="0" rtlCol="0" fromWordArt="0" anchor="t" anchorCtr="0" forceAA="0" upright="0" compatLnSpc="0">
-              <a:spAutoFit/>
-            </a:bodyPr>
-            <a:p>
-              <a:pPr algn="ctr">
-                <a:defRPr/>
-              </a:pPr>
-              <a:r>
-                <a:rPr>
-                  <a:solidFill>
-                    <a:schemeClr val="bg1"/>
-                  </a:solidFill>
-                </a:rPr>
-                <a:t>PXELINUX</a:t>
-              </a:r>
-              <a:endParaRPr>
-                <a:solidFill>
-                  <a:schemeClr val="bg1"/>
-                </a:solidFill>
-              </a:endParaRPr>
-            </a:p>
-          </p:txBody>
-        </p:sp>
-      </p:grpSp>
-      <p:grpSp>
-        <p:nvGrpSpPr>
-          <p:cNvPr id="68696946" name=""/>
-          <p:cNvGrpSpPr/>
-          <p:nvPr/>
-        </p:nvGrpSpPr>
-        <p:grpSpPr bwMode="auto">
-          <a:xfrm rot="0" flipH="0" flipV="0">
-            <a:off x="2856656" y="3794759"/>
-            <a:ext cx="985877" cy="366480"/>
-            <a:chOff x="0" y="0"/>
-            <a:chExt cx="985877" cy="366480"/>
-          </a:xfrm>
-        </p:grpSpPr>
-        <p:sp>
-          <p:nvSpPr>
-            <p:cNvPr id="1981706135" name=""/>
-            <p:cNvSpPr txBox="1"/>
-            <p:nvPr/>
-          </p:nvSpPr>
-          <p:spPr bwMode="auto">
-            <a:xfrm rot="0" flipH="0" flipV="0">
-              <a:off x="0" y="360"/>
-              <a:ext cx="981557" cy="366119"/>
-            </a:xfrm>
-            <a:prstGeom prst="rect">
-              <a:avLst/>
-            </a:prstGeom>
-            <a:solidFill>
-              <a:schemeClr val="accent1">
-                <a:lumMod val="50000"/>
-              </a:schemeClr>
-            </a:solidFill>
-          </p:spPr>
-          <p:txBody>
-            <a:bodyPr vertOverflow="overflow" horzOverflow="overflow" vert="horz" wrap="square" lIns="91440" tIns="45720" rIns="91440" bIns="45720" numCol="1" spcCol="0" rtlCol="0" fromWordArt="0" anchor="t" anchorCtr="0" forceAA="0" upright="0" compatLnSpc="0">
-              <a:spAutoFit/>
-            </a:bodyPr>
-            <a:p>
-              <a:pPr algn="ctr">
-                <a:defRPr/>
-              </a:pPr>
-              <a:r>
-                <a:rPr>
-                  <a:solidFill>
-                    <a:schemeClr val="bg1"/>
-                  </a:solidFill>
-                </a:rPr>
-                <a:t>GRUB</a:t>
-              </a:r>
-              <a:endParaRPr>
-                <a:solidFill>
-                  <a:schemeClr val="bg1"/>
-                </a:solidFill>
-              </a:endParaRPr>
-            </a:p>
-          </p:txBody>
-        </p:sp>
-        <p:sp>
-          <p:nvSpPr>
-            <p:cNvPr id="589740663" name=""/>
-            <p:cNvSpPr/>
-            <p:nvPr/>
-          </p:nvSpPr>
-          <p:spPr bwMode="auto">
-            <a:xfrm rot="0" flipH="0" flipV="0">
-              <a:off x="0" y="0"/>
-              <a:ext cx="985877" cy="366120"/>
-            </a:xfrm>
-            <a:prstGeom prst="rect">
-              <a:avLst/>
-            </a:prstGeom>
-            <a:noFill/>
-            <a:ln w="12699" cap="flat" cmpd="sng" algn="ctr">
-              <a:solidFill>
-                <a:srgbClr val="00BCD9"/>
-              </a:solidFill>
-              <a:prstDash val="solid"/>
-              <a:miter lim="800000"/>
-            </a:ln>
-          </p:spPr>
-          <p:style>
-            <a:lnRef idx="2">
-              <a:schemeClr val="accent1">
-                <a:shade val="50000"/>
-              </a:schemeClr>
-            </a:lnRef>
-            <a:fillRef idx="1">
-              <a:schemeClr val="accent1"/>
-            </a:fillRef>
-            <a:effectRef idx="0">
-              <a:schemeClr val="accent1"/>
-            </a:effectRef>
-            <a:fontRef idx="minor">
-              <a:schemeClr val="lt1"/>
-            </a:fontRef>
-          </p:style>
-        </p:sp>
-      </p:grpSp>
-      <p:grpSp>
-        <p:nvGrpSpPr>
-          <p:cNvPr id="2061864935" name=""/>
-          <p:cNvGrpSpPr/>
-          <p:nvPr/>
-        </p:nvGrpSpPr>
-        <p:grpSpPr bwMode="auto">
-          <a:xfrm rot="0" flipH="0" flipV="0">
-            <a:off x="1487904" y="4160519"/>
-            <a:ext cx="2352579" cy="366120"/>
-            <a:chOff x="0" y="0"/>
-            <a:chExt cx="2352579" cy="366120"/>
-          </a:xfrm>
-        </p:grpSpPr>
-        <p:sp>
-          <p:nvSpPr>
-            <p:cNvPr id="2060075435" name=""/>
-            <p:cNvSpPr/>
-            <p:nvPr/>
-          </p:nvSpPr>
-          <p:spPr bwMode="auto">
-            <a:xfrm rot="0" flipH="0" flipV="0">
-              <a:off x="0" y="0"/>
-              <a:ext cx="2352579" cy="366120"/>
-            </a:xfrm>
-            <a:prstGeom prst="rect">
-              <a:avLst/>
-            </a:prstGeom>
-            <a:noFill/>
-            <a:ln w="19049" cap="flat" cmpd="sng" algn="ctr">
-              <a:solidFill>
-                <a:srgbClr val="00BCD9"/>
-              </a:solidFill>
-              <a:prstDash val="solid"/>
-              <a:miter lim="800000"/>
-            </a:ln>
-          </p:spPr>
-          <p:style>
-            <a:lnRef idx="2">
-              <a:schemeClr val="accent1">
-                <a:shade val="50000"/>
-              </a:schemeClr>
-            </a:lnRef>
-            <a:fillRef idx="1">
-              <a:schemeClr val="accent1"/>
-            </a:fillRef>
-            <a:effectRef idx="0">
-              <a:schemeClr val="accent1"/>
-            </a:effectRef>
-            <a:fontRef idx="minor">
-              <a:schemeClr val="lt1"/>
-            </a:fontRef>
-          </p:style>
-        </p:sp>
-        <p:sp>
-          <p:nvSpPr>
-            <p:cNvPr id="221654159" name=""/>
-            <p:cNvSpPr txBox="1"/>
-            <p:nvPr/>
-          </p:nvSpPr>
-          <p:spPr bwMode="auto">
-            <a:xfrm rot="0" flipH="0" flipV="0">
-              <a:off x="0" y="0"/>
-              <a:ext cx="2350308" cy="366119"/>
-            </a:xfrm>
-            <a:prstGeom prst="rect">
-              <a:avLst/>
-            </a:prstGeom>
-            <a:solidFill>
-              <a:schemeClr val="accent1">
-                <a:lumMod val="50000"/>
-              </a:schemeClr>
-            </a:solidFill>
-          </p:spPr>
-          <p:txBody>
-            <a:bodyPr vertOverflow="overflow" horzOverflow="overflow" vert="horz" wrap="square" lIns="91440" tIns="45720" rIns="91440" bIns="45720" numCol="1" spcCol="0" rtlCol="0" fromWordArt="0" anchor="t" anchorCtr="0" forceAA="0" upright="0" compatLnSpc="0">
-              <a:spAutoFit/>
-            </a:bodyPr>
-            <a:p>
-              <a:pPr algn="ctr">
-                <a:defRPr/>
-              </a:pPr>
-              <a:r>
-                <a:rPr>
-                  <a:solidFill>
-                    <a:schemeClr val="bg1"/>
-                  </a:solidFill>
-                </a:rPr>
-                <a:t>TFTP - Server</a:t>
-              </a:r>
-              <a:endParaRPr>
-                <a:solidFill>
-                  <a:schemeClr val="bg1"/>
-                </a:solidFill>
-              </a:endParaRPr>
-            </a:p>
-          </p:txBody>
-        </p:sp>
-      </p:grpSp>
+            <a:prstDash val="solid"/>
+            <a:miter lim="800000"/>
+          </a:ln>
+        </p:spPr>
+        <p:style>
+          <a:lnRef idx="2">
+            <a:schemeClr val="accent1">
+              <a:shade val="50000"/>
+            </a:schemeClr>
+          </a:lnRef>
+          <a:fillRef idx="1">
+            <a:schemeClr val="accent1"/>
+          </a:fillRef>
+          <a:effectRef idx="0">
+            <a:schemeClr val="accent1"/>
+          </a:effectRef>
+          <a:fontRef idx="minor">
+            <a:schemeClr val="lt1"/>
+          </a:fontRef>
+        </p:style>
+      </p:sp>
+      <p:sp>
+        <p:nvSpPr>
+          <p:cNvPr id="292512146" name="Titel 1"/>
+          <p:cNvSpPr>
+            <a:spLocks noGrp="1"/>
+          </p:cNvSpPr>
+          <p:nvPr>
+            <p:ph type="title"/>
+          </p:nvPr>
+        </p:nvSpPr>
+        <p:spPr bwMode="auto"/>
+        <p:txBody>
+          <a:bodyPr/>
+          <a:lstStyle/>
+          <a:p>
+            <a:pPr>
+              <a:defRPr/>
+            </a:pPr>
+            <a:r>
+              <a:rPr/>
+              <a:t>Linux-Installation: PXE</a:t>
+            </a:r>
+            <a:endParaRPr/>
+          </a:p>
+        </p:txBody>
+      </p:sp>
+      <p:sp>
+        <p:nvSpPr>
+          <p:cNvPr id="1178442517" name="Inhaltsplatzhalter 3"/>
+          <p:cNvSpPr>
+            <a:spLocks noGrp="1"/>
+          </p:cNvSpPr>
+          <p:nvPr>
+            <p:ph sz="half" idx="2"/>
+          </p:nvPr>
+        </p:nvSpPr>
+        <p:spPr bwMode="auto"/>
+        <p:txBody>
+          <a:bodyPr vertOverflow="overflow" horzOverflow="overflow" vert="horz" wrap="square" lIns="91440" tIns="45720" rIns="91440" bIns="45720" numCol="1" spcCol="0" rtlCol="0" fromWordArt="0" anchor="t" anchorCtr="0" forceAA="0" upright="0" compatLnSpc="0">
+            <a:normAutofit/>
+          </a:bodyPr>
+          <a:lstStyle/>
+          <a:p>
+            <a:pPr>
+              <a:lnSpc>
+                <a:spcPct val="114999"/>
+              </a:lnSpc>
+              <a:defRPr/>
+            </a:pPr>
+            <a:r>
+              <a:rPr/>
+              <a:t>Betriebssystem-Installation</a:t>
+            </a:r>
+            <a:endParaRPr/>
+          </a:p>
+          <a:p>
+            <a:pPr>
+              <a:lnSpc>
+                <a:spcPct val="114999"/>
+              </a:lnSpc>
+              <a:defRPr/>
+            </a:pPr>
+            <a:r>
+              <a:rPr/>
+              <a:t>Vorkonfigurierter Installationsprozess</a:t>
+            </a:r>
+            <a:endParaRPr/>
+          </a:p>
+          <a:p>
+            <a:pPr lvl="1">
+              <a:lnSpc>
+                <a:spcPct val="114999"/>
+              </a:lnSpc>
+              <a:defRPr/>
+            </a:pPr>
+            <a:r>
+              <a:rPr/>
+              <a:t>Remote-Zugriff</a:t>
+            </a:r>
+            <a:endParaRPr/>
+          </a:p>
+          <a:p>
+            <a:pPr lvl="1">
+              <a:lnSpc>
+                <a:spcPct val="114999"/>
+              </a:lnSpc>
+              <a:defRPr/>
+            </a:pPr>
+            <a:r>
+              <a:rPr/>
+              <a:t>IP-Konfiguration</a:t>
+            </a:r>
+            <a:endParaRPr/>
+          </a:p>
+          <a:p>
+            <a:pPr lvl="1">
+              <a:lnSpc>
+                <a:spcPct val="114999"/>
+              </a:lnSpc>
+              <a:defRPr/>
+            </a:pPr>
+            <a:r>
+              <a:rPr/>
+              <a:t>Bereit für Ansible</a:t>
+            </a:r>
+            <a:endParaRPr/>
+          </a:p>
+        </p:txBody>
+      </p:sp>
       <p:grpSp>
         <p:nvGrpSpPr>
           <p:cNvPr id="1728099827" name=""/>
@@ -6409,23 +6764,252 @@
       </p:grpSp>
       <p:sp>
         <p:nvSpPr>
-          <p:cNvPr id="158553839" name=""/>
-          <p:cNvSpPr/>
+          <p:cNvPr id="298648126" name=""/>
+          <p:cNvSpPr txBox="1"/>
           <p:nvPr/>
         </p:nvSpPr>
         <p:spPr bwMode="auto">
-          <a:xfrm rot="0" flipH="0" flipV="0">
-            <a:off x="1488839" y="2696759"/>
-            <a:ext cx="2351534" cy="366120"/>
+          <a:xfrm rot="16199969" flipH="0" flipV="0">
+            <a:off x="180000" y="3596099"/>
+            <a:ext cx="1916074" cy="396599"/>
           </a:xfrm>
           <a:prstGeom prst="rect">
             <a:avLst/>
           </a:prstGeom>
           <a:noFill/>
-          <a:ln w="19049" cap="flat" cmpd="sng" algn="ctr">
-            <a:solidFill>
-              <a:srgbClr val="00BCD9"/>
-            </a:solidFill>
+        </p:spPr>
+        <p:txBody>
+          <a:bodyPr vertOverflow="overflow" horzOverflow="overflow" vert="horz" wrap="square" lIns="91440" tIns="45720" rIns="91440" bIns="45720" numCol="1" spcCol="0" rtlCol="0" fromWordArt="0" anchor="t" anchorCtr="0" forceAA="0" upright="0" compatLnSpc="0">
+            <a:spAutoFit/>
+          </a:bodyPr>
+          <a:p>
+            <a:pPr algn="ctr">
+              <a:defRPr/>
+            </a:pPr>
+            <a:r>
+              <a:rPr sz="2000">
+                <a:solidFill>
+                  <a:schemeClr val="bg1"/>
+                </a:solidFill>
+              </a:rPr>
+              <a:t>PXE-Boot</a:t>
+            </a:r>
+            <a:endParaRPr sz="2000">
+              <a:solidFill>
+                <a:schemeClr val="bg1"/>
+              </a:solidFill>
+            </a:endParaRPr>
+          </a:p>
+        </p:txBody>
+      </p:sp>
+      <p:sp>
+        <p:nvSpPr>
+          <p:cNvPr id="1370016339" name=""/>
+          <p:cNvSpPr txBox="1"/>
+          <p:nvPr/>
+        </p:nvSpPr>
+        <p:spPr bwMode="auto">
+          <a:xfrm rot="0" flipH="0" flipV="0">
+            <a:off x="1544639" y="3154318"/>
+            <a:ext cx="2237772" cy="914760"/>
+          </a:xfrm>
+          <a:prstGeom prst="rect">
+            <a:avLst/>
+          </a:prstGeom>
+          <a:solidFill>
+            <a:srgbClr val="1F4E79"/>
+          </a:solidFill>
+        </p:spPr>
+        <p:txBody>
+          <a:bodyPr vertOverflow="overflow" horzOverflow="overflow" vert="horz" wrap="square" lIns="91440" tIns="45720" rIns="91440" bIns="45720" numCol="1" spcCol="0" rtlCol="0" fromWordArt="0" anchor="t" anchorCtr="0" forceAA="0" upright="0" compatLnSpc="0">
+            <a:spAutoFit/>
+          </a:bodyPr>
+          <a:p>
+            <a:pPr algn="ctr">
+              <a:defRPr/>
+            </a:pPr>
+            <a:r>
+              <a:rPr>
+                <a:solidFill>
+                  <a:schemeClr val="bg1"/>
+                </a:solidFill>
+              </a:rPr>
+              <a:t>Weitere Komponenten des PXE-Stack</a:t>
+            </a:r>
+            <a:endParaRPr>
+              <a:solidFill>
+                <a:schemeClr val="bg1"/>
+              </a:solidFill>
+            </a:endParaRPr>
+          </a:p>
+        </p:txBody>
+      </p:sp>
+    </p:spTree>
+  </p:cSld>
+  <p:clrMapOvr>
+    <a:masterClrMapping/>
+  </p:clrMapOvr>
+  <mc:AlternateContent xmlns:mc="http://schemas.openxmlformats.org/markup-compatibility/2006">
+    <mc:Choice xmlns:p159="http://schemas.microsoft.com/office/powerpoint/2015/09/main" xmlns:p14="http://schemas.microsoft.com/office/powerpoint/2010/main" Requires="p159">
+      <p:transition p14:dur="2000" advClick="1"/>
+    </mc:Choice>
+    <mc:Fallback>
+      <p:transition advClick="1"/>
+    </mc:Fallback>
+  </mc:AlternateContent>
+</p:sld>
+</file>
+
+<file path=ppt/slides/slide6.xml><?xml version="1.0" encoding="utf-8"?>
+<p:sld xmlns:a="http://schemas.openxmlformats.org/drawingml/2006/main" xmlns:r="http://schemas.openxmlformats.org/officeDocument/2006/relationships" xmlns:p="http://schemas.openxmlformats.org/presentationml/2006/main" xmlns:m="http://schemas.openxmlformats.org/officeDocument/2006/math" xmlns:w="http://schemas.openxmlformats.org/wordprocessingml/2006/main" xmlns:mc="http://schemas.openxmlformats.org/markup-compatibility/2006" showMasterPhAnim="0" showMasterSp="1" show="0">
+  <p:cSld name="">
+    <p:spTree>
+      <p:nvGrpSpPr>
+        <p:cNvPr id="1" name=""/>
+        <p:cNvGrpSpPr/>
+        <p:nvPr/>
+      </p:nvGrpSpPr>
+      <p:grpSpPr bwMode="auto">
+        <a:xfrm>
+          <a:off x="0" y="0"/>
+          <a:ext cx="0" cy="0"/>
+          <a:chOff x="0" y="0"/>
+          <a:chExt cx="0" cy="0"/>
+        </a:xfrm>
+      </p:grpSpPr>
+      <p:sp>
+        <p:nvSpPr>
+          <p:cNvPr id="1605369587" name="Titel 1"/>
+          <p:cNvSpPr>
+            <a:spLocks noGrp="1"/>
+          </p:cNvSpPr>
+          <p:nvPr>
+            <p:ph type="title"/>
+          </p:nvPr>
+        </p:nvSpPr>
+        <p:spPr bwMode="auto"/>
+        <p:txBody>
+          <a:bodyPr/>
+          <a:lstStyle/>
+          <a:p>
+            <a:pPr>
+              <a:defRPr/>
+            </a:pPr>
+            <a:r>
+              <a:rPr/>
+              <a:t>Linux-Installation: PXE</a:t>
+            </a:r>
+            <a:endParaRPr/>
+          </a:p>
+        </p:txBody>
+      </p:sp>
+      <p:sp>
+        <p:nvSpPr>
+          <p:cNvPr id="802441782" name="Inhaltsplatzhalter 3"/>
+          <p:cNvSpPr>
+            <a:spLocks noGrp="1"/>
+          </p:cNvSpPr>
+          <p:nvPr>
+            <p:ph sz="half" idx="2"/>
+          </p:nvPr>
+        </p:nvSpPr>
+        <p:spPr bwMode="auto">
+          <a:xfrm flipH="0" flipV="0">
+            <a:off x="6487498" y="1825623"/>
+            <a:ext cx="4866297" cy="4351338"/>
+          </a:xfrm>
+        </p:spPr>
+        <p:txBody>
+          <a:bodyPr vertOverflow="overflow" horzOverflow="overflow" vert="horz" wrap="square" lIns="91440" tIns="45720" rIns="91440" bIns="45720" numCol="1" spcCol="0" rtlCol="0" fromWordArt="0" anchor="t" anchorCtr="0" forceAA="0" upright="0" compatLnSpc="0">
+            <a:normAutofit/>
+          </a:bodyPr>
+          <a:lstStyle/>
+          <a:p>
+            <a:pPr>
+              <a:lnSpc>
+                <a:spcPct val="114999"/>
+              </a:lnSpc>
+              <a:defRPr/>
+            </a:pPr>
+            <a:r>
+              <a:rPr/>
+              <a:t>Betriebssystem-Installation</a:t>
+            </a:r>
+            <a:endParaRPr/>
+          </a:p>
+          <a:p>
+            <a:pPr>
+              <a:lnSpc>
+                <a:spcPct val="114999"/>
+              </a:lnSpc>
+              <a:defRPr/>
+            </a:pPr>
+            <a:r>
+              <a:rPr/>
+              <a:t>Vorkonfigurierter Installationsprozess</a:t>
+            </a:r>
+            <a:endParaRPr/>
+          </a:p>
+          <a:p>
+            <a:pPr lvl="1">
+              <a:lnSpc>
+                <a:spcPct val="114999"/>
+              </a:lnSpc>
+              <a:defRPr/>
+            </a:pPr>
+            <a:r>
+              <a:rPr/>
+              <a:t>Remote-Zugriff</a:t>
+            </a:r>
+            <a:endParaRPr/>
+          </a:p>
+          <a:p>
+            <a:pPr lvl="1">
+              <a:lnSpc>
+                <a:spcPct val="114999"/>
+              </a:lnSpc>
+              <a:defRPr/>
+            </a:pPr>
+            <a:r>
+              <a:rPr/>
+              <a:t>IP-Konfiguration</a:t>
+            </a:r>
+            <a:endParaRPr/>
+          </a:p>
+          <a:p>
+            <a:pPr lvl="1">
+              <a:lnSpc>
+                <a:spcPct val="114999"/>
+              </a:lnSpc>
+              <a:defRPr/>
+            </a:pPr>
+            <a:r>
+              <a:rPr/>
+              <a:t>Bereit für Ansible</a:t>
+            </a:r>
+            <a:endParaRPr/>
+          </a:p>
+        </p:txBody>
+      </p:sp>
+      <p:sp>
+        <p:nvSpPr>
+          <p:cNvPr id="254830530" name=""/>
+          <p:cNvSpPr/>
+          <p:nvPr/>
+        </p:nvSpPr>
+        <p:spPr bwMode="auto">
+          <a:xfrm rot="0" flipH="0" flipV="0">
+            <a:off x="838197" y="2327548"/>
+            <a:ext cx="3352798" cy="3019423"/>
+          </a:xfrm>
+          <a:prstGeom prst="rect">
+            <a:avLst/>
+          </a:prstGeom>
+          <a:solidFill>
+            <a:srgbClr val="00BCD9"/>
+          </a:solidFill>
+          <a:ln w="38099" cap="flat" cmpd="sng" algn="ctr">
+            <a:noFill/>
             <a:prstDash val="solid"/>
             <a:miter lim="800000"/>
           </a:ln>
@@ -6447,70 +7031,30 @@
           </a:fontRef>
         </p:style>
       </p:sp>
-      <p:sp>
-        <p:nvSpPr>
-          <p:cNvPr id="298648126" name=""/>
-          <p:cNvSpPr txBox="1"/>
-          <p:nvPr/>
-        </p:nvSpPr>
-        <p:spPr bwMode="auto">
-          <a:xfrm rot="16199969" flipH="0" flipV="0">
-            <a:off x="180000" y="3596099"/>
-            <a:ext cx="1916074" cy="396599"/>
-          </a:xfrm>
-          <a:prstGeom prst="rect">
-            <a:avLst/>
-          </a:prstGeom>
-          <a:noFill/>
-        </p:spPr>
-        <p:txBody>
-          <a:bodyPr vertOverflow="overflow" horzOverflow="overflow" vert="horz" wrap="square" lIns="91440" tIns="45720" rIns="91440" bIns="45720" numCol="1" spcCol="0" rtlCol="0" fromWordArt="0" anchor="t" anchorCtr="0" forceAA="0" upright="0" compatLnSpc="0">
-            <a:spAutoFit/>
-          </a:bodyPr>
-          <a:p>
-            <a:pPr algn="ctr">
-              <a:defRPr/>
-            </a:pPr>
-            <a:r>
-              <a:rPr sz="2000">
-                <a:solidFill>
-                  <a:schemeClr val="bg1"/>
-                </a:solidFill>
-              </a:rPr>
-              <a:t>PXE-Boot</a:t>
-            </a:r>
-            <a:endParaRPr sz="2000">
-              <a:solidFill>
-                <a:schemeClr val="bg1"/>
-              </a:solidFill>
-            </a:endParaRPr>
-          </a:p>
-        </p:txBody>
-      </p:sp>
       <p:grpSp>
         <p:nvGrpSpPr>
-          <p:cNvPr id="985295644" name=""/>
+          <p:cNvPr id="215769119" name=""/>
           <p:cNvGrpSpPr/>
           <p:nvPr/>
         </p:nvGrpSpPr>
         <p:grpSpPr bwMode="auto">
           <a:xfrm rot="0" flipH="0" flipV="0">
-            <a:off x="1487904" y="3428639"/>
-            <a:ext cx="2352468" cy="366120"/>
+            <a:off x="1487903" y="3794398"/>
+            <a:ext cx="1369470" cy="366120"/>
             <a:chOff x="0" y="0"/>
-            <a:chExt cx="2352468" cy="366120"/>
+            <a:chExt cx="1369470" cy="366120"/>
           </a:xfrm>
         </p:grpSpPr>
         <p:sp>
           <p:nvSpPr>
-            <p:cNvPr id="1956771642" name=""/>
+            <p:cNvPr id="899282385" name=""/>
             <p:cNvSpPr/>
             <p:nvPr/>
           </p:nvSpPr>
           <p:spPr bwMode="auto">
-            <a:xfrm rot="0" flipH="0" flipV="0">
+            <a:xfrm flipH="0" flipV="0">
               <a:off x="0" y="0"/>
-              <a:ext cx="2352468" cy="366120"/>
+              <a:ext cx="1368750" cy="366120"/>
             </a:xfrm>
             <a:prstGeom prst="rect">
               <a:avLst/>
@@ -6543,14 +7087,490 @@
         </p:sp>
         <p:sp>
           <p:nvSpPr>
-            <p:cNvPr id="1112396621" name=""/>
+            <p:cNvPr id="529283591" name=""/>
+            <p:cNvSpPr txBox="1"/>
+            <p:nvPr/>
+          </p:nvSpPr>
+          <p:spPr bwMode="auto">
+            <a:xfrm flipH="0" flipV="0">
+              <a:off x="0" y="0"/>
+              <a:ext cx="1369470" cy="366118"/>
+            </a:xfrm>
+            <a:prstGeom prst="rect">
+              <a:avLst/>
+            </a:prstGeom>
+            <a:solidFill>
+              <a:schemeClr val="accent1">
+                <a:lumMod val="50000"/>
+              </a:schemeClr>
+            </a:solidFill>
+          </p:spPr>
+          <p:txBody>
+            <a:bodyPr vertOverflow="overflow" horzOverflow="overflow" vert="horz" wrap="square" lIns="91440" tIns="45720" rIns="91440" bIns="45720" numCol="1" spcCol="0" rtlCol="0" fromWordArt="0" anchor="t" anchorCtr="0" forceAA="0" upright="0" compatLnSpc="0">
+              <a:spAutoFit/>
+            </a:bodyPr>
+            <a:p>
+              <a:pPr algn="ctr">
+                <a:defRPr/>
+              </a:pPr>
+              <a:r>
+                <a:rPr>
+                  <a:solidFill>
+                    <a:schemeClr val="bg1"/>
+                  </a:solidFill>
+                </a:rPr>
+                <a:t>PXELINUX</a:t>
+              </a:r>
+              <a:endParaRPr>
+                <a:solidFill>
+                  <a:schemeClr val="bg1"/>
+                </a:solidFill>
+              </a:endParaRPr>
+            </a:p>
+          </p:txBody>
+        </p:sp>
+      </p:grpSp>
+      <p:grpSp>
+        <p:nvGrpSpPr>
+          <p:cNvPr id="1767754658" name=""/>
+          <p:cNvGrpSpPr/>
+          <p:nvPr/>
+        </p:nvGrpSpPr>
+        <p:grpSpPr bwMode="auto">
+          <a:xfrm rot="0" flipH="0" flipV="0">
+            <a:off x="2856655" y="3794758"/>
+            <a:ext cx="985876" cy="366480"/>
+            <a:chOff x="0" y="0"/>
+            <a:chExt cx="985876" cy="366480"/>
+          </a:xfrm>
+        </p:grpSpPr>
+        <p:sp>
+          <p:nvSpPr>
+            <p:cNvPr id="735988738" name=""/>
+            <p:cNvSpPr txBox="1"/>
+            <p:nvPr/>
+          </p:nvSpPr>
+          <p:spPr bwMode="auto">
+            <a:xfrm rot="0" flipH="0" flipV="0">
+              <a:off x="0" y="360"/>
+              <a:ext cx="981556" cy="366118"/>
+            </a:xfrm>
+            <a:prstGeom prst="rect">
+              <a:avLst/>
+            </a:prstGeom>
+            <a:solidFill>
+              <a:schemeClr val="accent1">
+                <a:lumMod val="50000"/>
+              </a:schemeClr>
+            </a:solidFill>
+          </p:spPr>
+          <p:txBody>
+            <a:bodyPr vertOverflow="overflow" horzOverflow="overflow" vert="horz" wrap="square" lIns="91440" tIns="45720" rIns="91440" bIns="45720" numCol="1" spcCol="0" rtlCol="0" fromWordArt="0" anchor="t" anchorCtr="0" forceAA="0" upright="0" compatLnSpc="0">
+              <a:spAutoFit/>
+            </a:bodyPr>
+            <a:p>
+              <a:pPr algn="ctr">
+                <a:defRPr/>
+              </a:pPr>
+              <a:r>
+                <a:rPr>
+                  <a:solidFill>
+                    <a:schemeClr val="bg1"/>
+                  </a:solidFill>
+                </a:rPr>
+                <a:t>GRUB</a:t>
+              </a:r>
+              <a:endParaRPr>
+                <a:solidFill>
+                  <a:schemeClr val="bg1"/>
+                </a:solidFill>
+              </a:endParaRPr>
+            </a:p>
+          </p:txBody>
+        </p:sp>
+        <p:sp>
+          <p:nvSpPr>
+            <p:cNvPr id="1098042095" name=""/>
+            <p:cNvSpPr/>
+            <p:nvPr/>
+          </p:nvSpPr>
+          <p:spPr bwMode="auto">
+            <a:xfrm rot="0" flipH="0" flipV="0">
+              <a:off x="0" y="0"/>
+              <a:ext cx="985876" cy="366120"/>
+            </a:xfrm>
+            <a:prstGeom prst="rect">
+              <a:avLst/>
+            </a:prstGeom>
+            <a:noFill/>
+            <a:ln w="12699" cap="flat" cmpd="sng" algn="ctr">
+              <a:solidFill>
+                <a:srgbClr val="00BCD9"/>
+              </a:solidFill>
+              <a:prstDash val="solid"/>
+              <a:miter lim="800000"/>
+            </a:ln>
+          </p:spPr>
+          <p:style>
+            <a:lnRef idx="2">
+              <a:schemeClr val="accent1">
+                <a:shade val="50000"/>
+              </a:schemeClr>
+            </a:lnRef>
+            <a:fillRef idx="1">
+              <a:schemeClr val="accent1"/>
+            </a:fillRef>
+            <a:effectRef idx="0">
+              <a:schemeClr val="accent1"/>
+            </a:effectRef>
+            <a:fontRef idx="minor">
+              <a:schemeClr val="lt1"/>
+            </a:fontRef>
+          </p:style>
+        </p:sp>
+      </p:grpSp>
+      <p:grpSp>
+        <p:nvGrpSpPr>
+          <p:cNvPr id="626740176" name=""/>
+          <p:cNvGrpSpPr/>
+          <p:nvPr/>
+        </p:nvGrpSpPr>
+        <p:grpSpPr bwMode="auto">
+          <a:xfrm rot="0" flipH="0" flipV="0">
+            <a:off x="1487903" y="4160518"/>
+            <a:ext cx="2352577" cy="366120"/>
+            <a:chOff x="0" y="0"/>
+            <a:chExt cx="2352577" cy="366120"/>
+          </a:xfrm>
+        </p:grpSpPr>
+        <p:sp>
+          <p:nvSpPr>
+            <p:cNvPr id="375004265" name=""/>
+            <p:cNvSpPr/>
+            <p:nvPr/>
+          </p:nvSpPr>
+          <p:spPr bwMode="auto">
+            <a:xfrm rot="0" flipH="0" flipV="0">
+              <a:off x="0" y="0"/>
+              <a:ext cx="2352577" cy="366120"/>
+            </a:xfrm>
+            <a:prstGeom prst="rect">
+              <a:avLst/>
+            </a:prstGeom>
+            <a:noFill/>
+            <a:ln w="19049" cap="flat" cmpd="sng" algn="ctr">
+              <a:solidFill>
+                <a:srgbClr val="00BCD9"/>
+              </a:solidFill>
+              <a:prstDash val="solid"/>
+              <a:miter lim="800000"/>
+            </a:ln>
+          </p:spPr>
+          <p:style>
+            <a:lnRef idx="2">
+              <a:schemeClr val="accent1">
+                <a:shade val="50000"/>
+              </a:schemeClr>
+            </a:lnRef>
+            <a:fillRef idx="1">
+              <a:schemeClr val="accent1"/>
+            </a:fillRef>
+            <a:effectRef idx="0">
+              <a:schemeClr val="accent1"/>
+            </a:effectRef>
+            <a:fontRef idx="minor">
+              <a:schemeClr val="lt1"/>
+            </a:fontRef>
+          </p:style>
+        </p:sp>
+        <p:sp>
+          <p:nvSpPr>
+            <p:cNvPr id="1287920911" name=""/>
             <p:cNvSpPr txBox="1"/>
             <p:nvPr/>
           </p:nvSpPr>
           <p:spPr bwMode="auto">
             <a:xfrm rot="0" flipH="0" flipV="0">
               <a:off x="0" y="0"/>
-              <a:ext cx="2350308" cy="366119"/>
+              <a:ext cx="2350307" cy="366118"/>
+            </a:xfrm>
+            <a:prstGeom prst="rect">
+              <a:avLst/>
+            </a:prstGeom>
+            <a:solidFill>
+              <a:schemeClr val="accent1">
+                <a:lumMod val="50000"/>
+              </a:schemeClr>
+            </a:solidFill>
+          </p:spPr>
+          <p:txBody>
+            <a:bodyPr vertOverflow="overflow" horzOverflow="overflow" vert="horz" wrap="square" lIns="91440" tIns="45720" rIns="91440" bIns="45720" numCol="1" spcCol="0" rtlCol="0" fromWordArt="0" anchor="t" anchorCtr="0" forceAA="0" upright="0" compatLnSpc="0">
+              <a:spAutoFit/>
+            </a:bodyPr>
+            <a:p>
+              <a:pPr algn="ctr">
+                <a:defRPr/>
+              </a:pPr>
+              <a:r>
+                <a:rPr>
+                  <a:solidFill>
+                    <a:schemeClr val="bg1"/>
+                  </a:solidFill>
+                </a:rPr>
+                <a:t>TFTP - Server</a:t>
+              </a:r>
+              <a:endParaRPr>
+                <a:solidFill>
+                  <a:schemeClr val="bg1"/>
+                </a:solidFill>
+              </a:endParaRPr>
+            </a:p>
+          </p:txBody>
+        </p:sp>
+      </p:grpSp>
+      <p:grpSp>
+        <p:nvGrpSpPr>
+          <p:cNvPr id="66080338" name=""/>
+          <p:cNvGrpSpPr/>
+          <p:nvPr/>
+        </p:nvGrpSpPr>
+        <p:grpSpPr bwMode="auto">
+          <a:xfrm rot="0" flipH="0" flipV="0">
+            <a:off x="1487903" y="4526638"/>
+            <a:ext cx="2352521" cy="366120"/>
+            <a:chOff x="0" y="0"/>
+            <a:chExt cx="2352521" cy="366120"/>
+          </a:xfrm>
+        </p:grpSpPr>
+        <p:sp>
+          <p:nvSpPr>
+            <p:cNvPr id="1047508847" name=""/>
+            <p:cNvSpPr/>
+            <p:nvPr/>
+          </p:nvSpPr>
+          <p:spPr bwMode="auto">
+            <a:xfrm rot="0" flipH="0" flipV="0">
+              <a:off x="0" y="0"/>
+              <a:ext cx="2352521" cy="366120"/>
+            </a:xfrm>
+            <a:prstGeom prst="rect">
+              <a:avLst/>
+            </a:prstGeom>
+            <a:noFill/>
+            <a:ln w="19049" cap="flat" cmpd="sng" algn="ctr">
+              <a:solidFill>
+                <a:srgbClr val="00BCD9"/>
+              </a:solidFill>
+              <a:prstDash val="solid"/>
+              <a:miter lim="800000"/>
+            </a:ln>
+          </p:spPr>
+          <p:style>
+            <a:lnRef idx="2">
+              <a:schemeClr val="accent1">
+                <a:shade val="50000"/>
+              </a:schemeClr>
+            </a:lnRef>
+            <a:fillRef idx="1">
+              <a:schemeClr val="accent1"/>
+            </a:fillRef>
+            <a:effectRef idx="0">
+              <a:schemeClr val="accent1"/>
+            </a:effectRef>
+            <a:fontRef idx="minor">
+              <a:schemeClr val="lt1"/>
+            </a:fontRef>
+          </p:style>
+        </p:sp>
+        <p:sp>
+          <p:nvSpPr>
+            <p:cNvPr id="629445031" name=""/>
+            <p:cNvSpPr txBox="1"/>
+            <p:nvPr/>
+          </p:nvSpPr>
+          <p:spPr bwMode="auto">
+            <a:xfrm rot="0" flipH="0" flipV="0">
+              <a:off x="0" y="0"/>
+              <a:ext cx="2350307" cy="366118"/>
+            </a:xfrm>
+            <a:prstGeom prst="rect">
+              <a:avLst/>
+            </a:prstGeom>
+            <a:solidFill>
+              <a:schemeClr val="accent1">
+                <a:lumMod val="50000"/>
+              </a:schemeClr>
+            </a:solidFill>
+          </p:spPr>
+          <p:txBody>
+            <a:bodyPr vertOverflow="overflow" horzOverflow="overflow" vert="horz" wrap="square" lIns="91440" tIns="45720" rIns="91440" bIns="45720" numCol="1" spcCol="0" rtlCol="0" fromWordArt="0" anchor="t" anchorCtr="0" forceAA="0" upright="0" compatLnSpc="0">
+              <a:spAutoFit/>
+            </a:bodyPr>
+            <a:p>
+              <a:pPr algn="ctr">
+                <a:defRPr/>
+              </a:pPr>
+              <a:r>
+                <a:rPr>
+                  <a:solidFill>
+                    <a:schemeClr val="bg1"/>
+                  </a:solidFill>
+                </a:rPr>
+                <a:t>DHCP - Server</a:t>
+              </a:r>
+              <a:endParaRPr>
+                <a:solidFill>
+                  <a:schemeClr val="bg1"/>
+                </a:solidFill>
+              </a:endParaRPr>
+            </a:p>
+          </p:txBody>
+        </p:sp>
+      </p:grpSp>
+      <p:sp>
+        <p:nvSpPr>
+          <p:cNvPr id="957059300" name=""/>
+          <p:cNvSpPr/>
+          <p:nvPr/>
+        </p:nvSpPr>
+        <p:spPr bwMode="auto">
+          <a:xfrm rot="0" flipH="0" flipV="0">
+            <a:off x="1488838" y="2696758"/>
+            <a:ext cx="2351533" cy="366120"/>
+          </a:xfrm>
+          <a:prstGeom prst="rect">
+            <a:avLst/>
+          </a:prstGeom>
+          <a:noFill/>
+          <a:ln w="19049" cap="flat" cmpd="sng" algn="ctr">
+            <a:solidFill>
+              <a:srgbClr val="00BCD9"/>
+            </a:solidFill>
+            <a:prstDash val="solid"/>
+            <a:miter lim="800000"/>
+          </a:ln>
+        </p:spPr>
+        <p:style>
+          <a:lnRef idx="2">
+            <a:schemeClr val="accent1">
+              <a:shade val="50000"/>
+            </a:schemeClr>
+          </a:lnRef>
+          <a:fillRef idx="1">
+            <a:schemeClr val="accent1"/>
+          </a:fillRef>
+          <a:effectRef idx="0">
+            <a:schemeClr val="accent1"/>
+          </a:effectRef>
+          <a:fontRef idx="minor">
+            <a:schemeClr val="lt1"/>
+          </a:fontRef>
+        </p:style>
+      </p:sp>
+      <p:sp>
+        <p:nvSpPr>
+          <p:cNvPr id="581040602" name=""/>
+          <p:cNvSpPr txBox="1"/>
+          <p:nvPr/>
+        </p:nvSpPr>
+        <p:spPr bwMode="auto">
+          <a:xfrm rot="16199933" flipH="0" flipV="0">
+            <a:off x="180000" y="3596098"/>
+            <a:ext cx="1916073" cy="396598"/>
+          </a:xfrm>
+          <a:prstGeom prst="rect">
+            <a:avLst/>
+          </a:prstGeom>
+          <a:noFill/>
+        </p:spPr>
+        <p:txBody>
+          <a:bodyPr vertOverflow="overflow" horzOverflow="overflow" vert="horz" wrap="square" lIns="91440" tIns="45720" rIns="91440" bIns="45720" numCol="1" spcCol="0" rtlCol="0" fromWordArt="0" anchor="t" anchorCtr="0" forceAA="0" upright="0" compatLnSpc="0">
+            <a:spAutoFit/>
+          </a:bodyPr>
+          <a:p>
+            <a:pPr algn="ctr">
+              <a:defRPr/>
+            </a:pPr>
+            <a:r>
+              <a:rPr sz="2000">
+                <a:solidFill>
+                  <a:schemeClr val="bg1"/>
+                </a:solidFill>
+              </a:rPr>
+              <a:t>PXE-Boot</a:t>
+            </a:r>
+            <a:endParaRPr sz="2000">
+              <a:solidFill>
+                <a:schemeClr val="bg1"/>
+              </a:solidFill>
+            </a:endParaRPr>
+          </a:p>
+        </p:txBody>
+      </p:sp>
+      <p:grpSp>
+        <p:nvGrpSpPr>
+          <p:cNvPr id="423108172" name=""/>
+          <p:cNvGrpSpPr/>
+          <p:nvPr/>
+        </p:nvGrpSpPr>
+        <p:grpSpPr bwMode="auto">
+          <a:xfrm rot="0" flipH="0" flipV="0">
+            <a:off x="1487903" y="3428638"/>
+            <a:ext cx="2352467" cy="366120"/>
+            <a:chOff x="0" y="0"/>
+            <a:chExt cx="2352467" cy="366120"/>
+          </a:xfrm>
+        </p:grpSpPr>
+        <p:sp>
+          <p:nvSpPr>
+            <p:cNvPr id="1564571866" name=""/>
+            <p:cNvSpPr/>
+            <p:nvPr/>
+          </p:nvSpPr>
+          <p:spPr bwMode="auto">
+            <a:xfrm rot="0" flipH="0" flipV="0">
+              <a:off x="0" y="0"/>
+              <a:ext cx="2352467" cy="366120"/>
+            </a:xfrm>
+            <a:prstGeom prst="rect">
+              <a:avLst/>
+            </a:prstGeom>
+            <a:noFill/>
+            <a:ln w="19049" cap="flat" cmpd="sng" algn="ctr">
+              <a:solidFill>
+                <a:srgbClr val="00BCD9"/>
+              </a:solidFill>
+              <a:prstDash val="solid"/>
+              <a:miter lim="800000"/>
+            </a:ln>
+          </p:spPr>
+          <p:style>
+            <a:lnRef idx="2">
+              <a:schemeClr val="accent1">
+                <a:shade val="50000"/>
+              </a:schemeClr>
+            </a:lnRef>
+            <a:fillRef idx="1">
+              <a:schemeClr val="accent1"/>
+            </a:fillRef>
+            <a:effectRef idx="0">
+              <a:schemeClr val="accent1"/>
+            </a:effectRef>
+            <a:fontRef idx="minor">
+              <a:schemeClr val="lt1"/>
+            </a:fontRef>
+          </p:style>
+        </p:sp>
+        <p:sp>
+          <p:nvSpPr>
+            <p:cNvPr id="1430820754" name=""/>
+            <p:cNvSpPr txBox="1"/>
+            <p:nvPr/>
+          </p:nvSpPr>
+          <p:spPr bwMode="auto">
+            <a:xfrm rot="0" flipH="0" flipV="0">
+              <a:off x="0" y="0"/>
+              <a:ext cx="2350307" cy="366118"/>
             </a:xfrm>
             <a:prstGeom prst="rect">
               <a:avLst/>
@@ -6588,14 +7608,14 @@
       </p:grpSp>
       <p:sp>
         <p:nvSpPr>
-          <p:cNvPr id="1370016339" name=""/>
+          <p:cNvPr id="515600441" name=""/>
           <p:cNvSpPr txBox="1"/>
           <p:nvPr/>
         </p:nvSpPr>
         <p:spPr bwMode="auto">
           <a:xfrm rot="0" flipH="0" flipV="0">
-            <a:off x="1488838" y="2696760"/>
-            <a:ext cx="2355853" cy="366119"/>
+            <a:off x="1488837" y="2696760"/>
+            <a:ext cx="2355852" cy="366118"/>
           </a:xfrm>
           <a:prstGeom prst="rect">
             <a:avLst/>
@@ -6632,14 +7652,14 @@
       </p:sp>
       <p:sp>
         <p:nvSpPr>
-          <p:cNvPr id="729100973" name=""/>
+          <p:cNvPr id="297644348" name=""/>
           <p:cNvSpPr/>
           <p:nvPr/>
         </p:nvSpPr>
         <p:spPr bwMode="auto">
           <a:xfrm rot="0" flipH="0" flipV="0">
-            <a:off x="1485960" y="3062880"/>
-            <a:ext cx="2351533" cy="366120"/>
+            <a:off x="1485959" y="3062880"/>
+            <a:ext cx="2351532" cy="366120"/>
           </a:xfrm>
           <a:prstGeom prst="rect">
             <a:avLst/>
@@ -6672,14 +7692,14 @@
       </p:sp>
       <p:sp>
         <p:nvSpPr>
-          <p:cNvPr id="962905638" name=""/>
+          <p:cNvPr id="1812623750" name=""/>
           <p:cNvSpPr txBox="1"/>
           <p:nvPr/>
         </p:nvSpPr>
         <p:spPr bwMode="auto">
           <a:xfrm rot="0" flipH="0" flipV="0">
-            <a:off x="1485960" y="3062880"/>
-            <a:ext cx="2354413" cy="366119"/>
+            <a:off x="1485959" y="3062880"/>
+            <a:ext cx="2354412" cy="366118"/>
           </a:xfrm>
           <a:prstGeom prst="rect">
             <a:avLst/>
@@ -6703,9 +7723,9 @@
                 <a:solidFill>
                   <a:schemeClr val="bg1"/>
                 </a:solidFill>
-                <a:latin typeface="+mn-lt"/>
-                <a:ea typeface="+mn-ea"/>
-                <a:cs typeface="+mn-cs"/>
+                <a:latin typeface="Arial"/>
+                <a:ea typeface="Arial"/>
+                <a:cs typeface="Arial"/>
               </a:rPr>
               <a:t>Linux - Installer</a:t>
             </a:r>
@@ -6719,14 +7739,14 @@
       </p:sp>
       <p:sp>
         <p:nvSpPr>
-          <p:cNvPr id="1545245095" name=""/>
+          <p:cNvPr id="1869315379" name=""/>
           <p:cNvSpPr/>
           <p:nvPr/>
         </p:nvSpPr>
         <p:spPr bwMode="auto">
           <a:xfrm flipH="0" flipV="0">
-            <a:off x="4325650" y="3821387"/>
-            <a:ext cx="291875" cy="1071372"/>
+            <a:off x="4325649" y="3821386"/>
+            <a:ext cx="291874" cy="1071371"/>
           </a:xfrm>
           <a:prstGeom prst="rightBrace">
             <a:avLst>
@@ -6772,14 +7792,14 @@
       </p:sp>
       <p:sp>
         <p:nvSpPr>
-          <p:cNvPr id="2093788254" name=""/>
+          <p:cNvPr id="1780380216" name=""/>
           <p:cNvSpPr txBox="1"/>
           <p:nvPr/>
         </p:nvSpPr>
         <p:spPr bwMode="auto">
           <a:xfrm rot="0" flipH="0" flipV="0">
-            <a:off x="4649276" y="4036853"/>
-            <a:ext cx="915018" cy="640440"/>
+            <a:off x="4649275" y="4036851"/>
+            <a:ext cx="915017" cy="640440"/>
           </a:xfrm>
           <a:prstGeom prst="rect">
             <a:avLst/>
@@ -6812,14 +7832,14 @@
       </p:sp>
       <p:sp>
         <p:nvSpPr>
-          <p:cNvPr id="832951643" name=""/>
+          <p:cNvPr id="1366314894" name=""/>
           <p:cNvSpPr/>
           <p:nvPr/>
         </p:nvSpPr>
         <p:spPr bwMode="auto">
           <a:xfrm flipH="0" flipV="0">
-            <a:off x="4325650" y="2720932"/>
-            <a:ext cx="291874" cy="1073467"/>
+            <a:off x="4325649" y="2720931"/>
+            <a:ext cx="291872" cy="1073466"/>
           </a:xfrm>
           <a:prstGeom prst="rightBrace">
             <a:avLst>
@@ -6856,14 +7876,14 @@
       </p:sp>
       <p:sp>
         <p:nvSpPr>
-          <p:cNvPr id="1885127481" name=""/>
+          <p:cNvPr id="1040785403" name=""/>
           <p:cNvSpPr txBox="1"/>
           <p:nvPr/>
         </p:nvSpPr>
         <p:spPr bwMode="auto">
           <a:xfrm rot="0" flipH="0" flipV="0">
-            <a:off x="4649275" y="2937444"/>
-            <a:ext cx="1289012" cy="640440"/>
+            <a:off x="4649274" y="2937443"/>
+            <a:ext cx="1289011" cy="640440"/>
           </a:xfrm>
           <a:prstGeom prst="rect">
             <a:avLst/>
@@ -6928,7 +7948,7 @@
 </p:sld>
 </file>
 
-<file path=ppt/slides/slide5.xml><?xml version="1.0" encoding="utf-8"?>
+<file path=ppt/slides/slide7.xml><?xml version="1.0" encoding="utf-8"?>
 <p:sld xmlns:a="http://schemas.openxmlformats.org/drawingml/2006/main" xmlns:r="http://schemas.openxmlformats.org/officeDocument/2006/relationships" xmlns:p="http://schemas.openxmlformats.org/presentationml/2006/main" xmlns:m="http://schemas.openxmlformats.org/officeDocument/2006/math" xmlns:w="http://schemas.openxmlformats.org/wordprocessingml/2006/main" xmlns:mc="http://schemas.openxmlformats.org/markup-compatibility/2006" showMasterPhAnim="0" showMasterSp="1" show="1">
   <p:cSld name="">
     <p:spTree>
@@ -7740,7 +8760,7 @@
 </p:sld>
 </file>
 
-<file path=ppt/slides/slide6.xml><?xml version="1.0" encoding="utf-8"?>
+<file path=ppt/slides/slide8.xml><?xml version="1.0" encoding="utf-8"?>
 <p:sld xmlns:a="http://schemas.openxmlformats.org/drawingml/2006/main" xmlns:r="http://schemas.openxmlformats.org/officeDocument/2006/relationships" xmlns:p="http://schemas.openxmlformats.org/presentationml/2006/main" xmlns:m="http://schemas.openxmlformats.org/officeDocument/2006/math" xmlns:w="http://schemas.openxmlformats.org/wordprocessingml/2006/main" xmlns:mc="http://schemas.openxmlformats.org/markup-compatibility/2006" showMasterPhAnim="0" showMasterSp="1" show="1">
   <p:cSld name="">
     <p:spTree>
@@ -8098,7 +9118,7 @@
           </p:nvGrpSpPr>
           <p:grpSpPr bwMode="auto">
             <a:xfrm rot="0" flipH="0" flipV="0">
-              <a:off x="4960717" y="1104599"/>
+              <a:off x="4960716" y="1104599"/>
               <a:ext cx="935981" cy="601044"/>
               <a:chOff x="0" y="0"/>
               <a:chExt cx="935981" cy="601044"/>
@@ -8543,7 +9563,7 @@
 </p:sld>
 </file>
 
-<file path=ppt/slides/slide7.xml><?xml version="1.0" encoding="utf-8"?>
+<file path=ppt/slides/slide9.xml><?xml version="1.0" encoding="utf-8"?>
 <p:sld xmlns:a="http://schemas.openxmlformats.org/drawingml/2006/main" xmlns:r="http://schemas.openxmlformats.org/officeDocument/2006/relationships" xmlns:p="http://schemas.openxmlformats.org/presentationml/2006/main" xmlns:m="http://schemas.openxmlformats.org/officeDocument/2006/math" xmlns:w="http://schemas.openxmlformats.org/wordprocessingml/2006/main" xmlns:mc="http://schemas.openxmlformats.org/markup-compatibility/2006" showMasterPhAnim="0" showMasterSp="1" show="1">
   <p:cSld name="">
     <p:spTree>
@@ -8597,7 +9617,7 @@
           </p:nvPr>
         </p:nvGraphicFramePr>
         <p:xfrm>
-          <a:off x="838199" y="1825624"/>
+          <a:off x="838198" y="1825624"/>
           <a:ext cx="10515600" cy="1346088"/>
         </p:xfrm>
         <a:graphic>
@@ -8633,7 +9653,7 @@
                       </a:pPr>
                       <a:r>
                         <a:rPr/>
-                        <a:t>Alt</a:t>
+                        <a:t>Bisher</a:t>
                       </a:r>
                       <a:endParaRPr/>
                     </a:p>
@@ -8699,7 +9719,7 @@
                       </a:pPr>
                       <a:r>
                         <a:rPr/>
-                        <a:t>PXE, automatisiert („fire and forget“)</a:t>
+                        <a:t>PXE: automatisiert</a:t>
                       </a:r>
                       <a:endParaRPr/>
                     </a:p>
@@ -8717,7 +9737,7 @@
                       </a:pPr>
                       <a:r>
                         <a:rPr/>
-                        <a:t>Initiale Einrichtung</a:t>
+                        <a:t>(Initiale) Einrichtung</a:t>
                       </a:r>
                       <a:endParaRPr/>
                     </a:p>
@@ -8817,7 +9837,7 @@
                       </a:pPr>
                       <a:r>
                         <a:rPr/>
-                        <a:t>Fehleranfälligkeit</a:t>
+                        <a:t>Ausfallsicherheit</a:t>
                       </a:r>
                       <a:endParaRPr/>
                     </a:p>
@@ -8917,7 +9937,7 @@
                       </a:pPr>
                       <a:r>
                         <a:rPr/>
-                        <a:t>Messdaten-Verfügbarkeit</a:t>
+                        <a:t>Messdaten-Mitnahme</a:t>
                       </a:r>
                       <a:endParaRPr/>
                     </a:p>
@@ -8949,7 +9969,7 @@
                       </a:pPr>
                       <a:r>
                         <a:rPr/>
-                        <a:t>Web, sonst.</a:t>
+                        <a:t>Web, sonst. wie bisher </a:t>
                       </a:r>
                       <a:endParaRPr/>
                     </a:p>
@@ -8961,350 +9981,6 @@
           </a:graphicData>
         </a:graphic>
       </p:graphicFrame>
-    </p:spTree>
-  </p:cSld>
-  <p:clrMapOvr>
-    <a:masterClrMapping/>
-  </p:clrMapOvr>
-  <mc:AlternateContent xmlns:mc="http://schemas.openxmlformats.org/markup-compatibility/2006">
-    <mc:Choice xmlns:p159="http://schemas.microsoft.com/office/powerpoint/2015/09/main" xmlns:p14="http://schemas.microsoft.com/office/powerpoint/2010/main" Requires="p159">
-      <p:transition p14:dur="2000" advClick="1"/>
-    </mc:Choice>
-    <mc:Fallback>
-      <p:transition advClick="1"/>
-    </mc:Fallback>
-  </mc:AlternateContent>
-</p:sld>
-</file>
-
-<file path=ppt/slides/slide8.xml><?xml version="1.0" encoding="utf-8"?>
-<p:sld xmlns:a="http://schemas.openxmlformats.org/drawingml/2006/main" xmlns:r="http://schemas.openxmlformats.org/officeDocument/2006/relationships" xmlns:p="http://schemas.openxmlformats.org/presentationml/2006/main" xmlns:m="http://schemas.openxmlformats.org/officeDocument/2006/math" xmlns:w="http://schemas.openxmlformats.org/wordprocessingml/2006/main" xmlns:mc="http://schemas.openxmlformats.org/markup-compatibility/2006" showMasterPhAnim="0" showMasterSp="1" show="1">
-  <p:cSld name="">
-    <p:spTree>
-      <p:nvGrpSpPr>
-        <p:cNvPr id="1" name=""/>
-        <p:cNvGrpSpPr/>
-        <p:nvPr/>
-      </p:nvGrpSpPr>
-      <p:grpSpPr bwMode="auto">
-        <a:xfrm>
-          <a:off x="0" y="0"/>
-          <a:ext cx="0" cy="0"/>
-          <a:chOff x="0" y="0"/>
-          <a:chExt cx="0" cy="0"/>
-        </a:xfrm>
-      </p:grpSpPr>
-      <p:sp>
-        <p:nvSpPr>
-          <p:cNvPr id="895144052" name="Titel 1"/>
-          <p:cNvSpPr>
-            <a:spLocks noGrp="1"/>
-          </p:cNvSpPr>
-          <p:nvPr>
-            <p:ph type="title"/>
-          </p:nvPr>
-        </p:nvSpPr>
-        <p:spPr bwMode="auto"/>
-        <p:txBody>
-          <a:bodyPr/>
-          <a:lstStyle/>
-          <a:p>
-            <a:pPr>
-              <a:defRPr/>
-            </a:pPr>
-            <a:r>
-              <a:rPr/>
-              <a:t>Arbeitsaufwand</a:t>
-            </a:r>
-            <a:endParaRPr/>
-          </a:p>
-        </p:txBody>
-      </p:sp>
-      <p:sp>
-        <p:nvSpPr>
-          <p:cNvPr id="704333148" name="Inhaltsplatzhalter 2"/>
-          <p:cNvSpPr>
-            <a:spLocks noGrp="1"/>
-          </p:cNvSpPr>
-          <p:nvPr>
-            <p:ph idx="1"/>
-          </p:nvPr>
-        </p:nvSpPr>
-        <p:spPr bwMode="auto"/>
-        <p:txBody>
-          <a:bodyPr vertOverflow="overflow" horzOverflow="overflow" vert="horz" wrap="square" lIns="91440" tIns="45720" rIns="91440" bIns="45720" numCol="1" spcCol="0" rtlCol="0" fromWordArt="0" anchor="t" anchorCtr="0" forceAA="0" upright="0" compatLnSpc="0">
-            <a:normAutofit fontScale="85000" lnSpcReduction="3000"/>
-          </a:bodyPr>
-          <a:lstStyle/>
-          <a:p>
-            <a:pPr>
-              <a:defRPr/>
-            </a:pPr>
-            <a:r>
-              <a:rPr/>
-              <a:t>Betriebssystem-Installation über PXE (Netzwerk-Boot)</a:t>
-            </a:r>
-            <a:endParaRPr/>
-          </a:p>
-          <a:p>
-            <a:pPr lvl="1">
-              <a:defRPr/>
-            </a:pPr>
-            <a:r>
-              <a:rPr/>
-              <a:t>Netzwerk-Konfigurationen der PCs im DHCP Server verwalten</a:t>
-            </a:r>
-            <a:endParaRPr/>
-          </a:p>
-          <a:p>
-            <a:pPr lvl="0">
-              <a:defRPr/>
-            </a:pPr>
-            <a:endParaRPr/>
-          </a:p>
-          <a:p>
-            <a:pPr>
-              <a:defRPr/>
-            </a:pPr>
-            <a:r>
-              <a:rPr/>
-              <a:t>Orchestrierung mittels Ansible</a:t>
-            </a:r>
-            <a:endParaRPr/>
-          </a:p>
-          <a:p>
-            <a:pPr lvl="1">
-              <a:defRPr/>
-            </a:pPr>
-            <a:r>
-              <a:rPr/>
-              <a:t>Initiale Einrichtung</a:t>
-            </a:r>
-            <a:endParaRPr/>
-          </a:p>
-          <a:p>
-            <a:pPr lvl="1">
-              <a:defRPr/>
-            </a:pPr>
-            <a:r>
-              <a:rPr/>
-              <a:t>Updates nur ausführen, wenn kein Praktikumsbetrieb</a:t>
-            </a:r>
-            <a:endParaRPr/>
-          </a:p>
-          <a:p>
-            <a:pPr lvl="1">
-              <a:defRPr/>
-            </a:pPr>
-            <a:r>
-              <a:rPr/>
-              <a:t>Versuchs-Software und Playbooks müssen gepflegt werden</a:t>
-            </a:r>
-            <a:endParaRPr/>
-          </a:p>
-          <a:p>
-            <a:pPr lvl="0">
-              <a:defRPr/>
-            </a:pPr>
-            <a:endParaRPr/>
-          </a:p>
-          <a:p>
-            <a:pPr lvl="0">
-              <a:defRPr/>
-            </a:pPr>
-            <a:r>
-              <a:rPr/>
-              <a:t>Speicher für Messdaten</a:t>
-            </a:r>
-            <a:endParaRPr/>
-          </a:p>
-          <a:p>
-            <a:pPr lvl="1">
-              <a:defRPr/>
-            </a:pPr>
-            <a:r>
-              <a:rPr/>
-              <a:t>Verfügbarkeit prüfen</a:t>
-            </a:r>
-            <a:endParaRPr/>
-          </a:p>
-          <a:p>
-            <a:pPr lvl="1">
-              <a:defRPr/>
-            </a:pPr>
-            <a:r>
-              <a:rPr/>
-              <a:t>Nach jedem Semester wieder zurücksetzen</a:t>
-            </a:r>
-            <a:endParaRPr/>
-          </a:p>
-        </p:txBody>
-      </p:sp>
-    </p:spTree>
-  </p:cSld>
-  <p:clrMapOvr>
-    <a:masterClrMapping/>
-  </p:clrMapOvr>
-  <mc:AlternateContent xmlns:mc="http://schemas.openxmlformats.org/markup-compatibility/2006">
-    <mc:Choice xmlns:p159="http://schemas.microsoft.com/office/powerpoint/2015/09/main" xmlns:p14="http://schemas.microsoft.com/office/powerpoint/2010/main" Requires="p159">
-      <p:transition p14:dur="2000" advClick="1"/>
-    </mc:Choice>
-    <mc:Fallback>
-      <p:transition advClick="1"/>
-    </mc:Fallback>
-  </mc:AlternateContent>
-</p:sld>
-</file>
-
-<file path=ppt/slides/slide9.xml><?xml version="1.0" encoding="utf-8"?>
-<p:sld xmlns:a="http://schemas.openxmlformats.org/drawingml/2006/main" xmlns:r="http://schemas.openxmlformats.org/officeDocument/2006/relationships" xmlns:p="http://schemas.openxmlformats.org/presentationml/2006/main" xmlns:m="http://schemas.openxmlformats.org/officeDocument/2006/math" xmlns:w="http://schemas.openxmlformats.org/wordprocessingml/2006/main" xmlns:mc="http://schemas.openxmlformats.org/markup-compatibility/2006" showMasterPhAnim="0" showMasterSp="1" show="1">
-  <p:cSld name="">
-    <p:spTree>
-      <p:nvGrpSpPr>
-        <p:cNvPr id="1" name=""/>
-        <p:cNvGrpSpPr/>
-        <p:nvPr/>
-      </p:nvGrpSpPr>
-      <p:grpSpPr bwMode="auto">
-        <a:xfrm>
-          <a:off x="0" y="0"/>
-          <a:ext cx="0" cy="0"/>
-          <a:chOff x="0" y="0"/>
-          <a:chExt cx="0" cy="0"/>
-        </a:xfrm>
-      </p:grpSpPr>
-      <p:sp>
-        <p:nvSpPr>
-          <p:cNvPr id="1149030658" name="Titel 1"/>
-          <p:cNvSpPr>
-            <a:spLocks noGrp="1"/>
-          </p:cNvSpPr>
-          <p:nvPr>
-            <p:ph type="title"/>
-          </p:nvPr>
-        </p:nvSpPr>
-        <p:spPr bwMode="auto"/>
-        <p:txBody>
-          <a:bodyPr/>
-          <a:lstStyle/>
-          <a:p>
-            <a:pPr>
-              <a:defRPr/>
-            </a:pPr>
-            <a:r>
-              <a:rPr/>
-              <a:t>Deployment:</a:t>
-            </a:r>
-            <a:endParaRPr/>
-          </a:p>
-        </p:txBody>
-      </p:sp>
-      <p:sp>
-        <p:nvSpPr>
-          <p:cNvPr id="1944900826" name="Inhaltsplatzhalter 2"/>
-          <p:cNvSpPr>
-            <a:spLocks noGrp="1"/>
-          </p:cNvSpPr>
-          <p:nvPr>
-            <p:ph idx="1"/>
-          </p:nvPr>
-        </p:nvSpPr>
-        <p:spPr bwMode="auto"/>
-        <p:txBody>
-          <a:bodyPr/>
-          <a:lstStyle/>
-          <a:p>
-            <a:pPr marL="394023" indent="-394023">
-              <a:buFont typeface="Arial"/>
-              <a:buAutoNum type="arabicPeriod"/>
-              <a:defRPr/>
-            </a:pPr>
-            <a:r>
-              <a:rPr/>
-              <a:t>MAC-Adresse des neuen PCs ermitteln</a:t>
-            </a:r>
-            <a:endParaRPr/>
-          </a:p>
-          <a:p>
-            <a:pPr marL="394023" indent="-394023">
-              <a:buFont typeface="Arial"/>
-              <a:buAutoNum type="arabicPeriod"/>
-              <a:defRPr/>
-            </a:pPr>
-            <a:r>
-              <a:rPr/>
-              <a:t>DHCP-Server konfigurieren</a:t>
-            </a:r>
-            <a:endParaRPr/>
-          </a:p>
-          <a:p>
-            <a:pPr lvl="1">
-              <a:defRPr/>
-            </a:pPr>
-            <a:r>
-              <a:rPr/>
-              <a:t>Hostname und IP-Adresse zuweisen</a:t>
-            </a:r>
-            <a:endParaRPr/>
-          </a:p>
-          <a:p>
-            <a:pPr marL="394023" lvl="0" indent="-394023">
-              <a:buFont typeface="Arial"/>
-              <a:buAutoNum type="arabicPeriod"/>
-              <a:defRPr/>
-            </a:pPr>
-            <a:r>
-              <a:rPr/>
-              <a:t>Netzwerk-Boot starten</a:t>
-            </a:r>
-            <a:endParaRPr/>
-          </a:p>
-          <a:p>
-            <a:pPr marL="394023" lvl="0" indent="-394023">
-              <a:buFont typeface="Arial"/>
-              <a:buAutoNum type="arabicPeriod"/>
-              <a:defRPr/>
-            </a:pPr>
-            <a:r>
-              <a:rPr/>
-              <a:t>Ansible</a:t>
-            </a:r>
-            <a:endParaRPr/>
-          </a:p>
-          <a:p>
-            <a:pPr lvl="1">
-              <a:defRPr/>
-            </a:pPr>
-            <a:r>
-              <a:rPr/>
-              <a:t>Neuen Client ins Inventory hinzufügen</a:t>
-            </a:r>
-            <a:endParaRPr/>
-          </a:p>
-          <a:p>
-            <a:pPr lvl="1">
-              <a:defRPr/>
-            </a:pPr>
-            <a:r>
-              <a:rPr/>
-              <a:t>Playbooks ausführen</a:t>
-            </a:r>
-            <a:endParaRPr/>
-          </a:p>
-          <a:p>
-            <a:pPr marL="394023" lvl="0" indent="-394023">
-              <a:buFont typeface="Arial"/>
-              <a:buAutoNum type="arabicPeriod"/>
-              <a:defRPr/>
-            </a:pPr>
-            <a:r>
-              <a:rPr/>
-              <a:t>Ausprobieren (Tutoren)</a:t>
-            </a:r>
-            <a:endParaRPr/>
-          </a:p>
-        </p:txBody>
-      </p:sp>
     </p:spTree>
   </p:cSld>
   <p:clrMapOvr>

</xml_diff>